<commit_message>
Jeff's UG, DG, PPP (#215)
* Make changes to UG and PPP

* Make changes to UG and PPP

* Make changes to DG

* Refactor AddApptCommand to better suit Sequence Diagram

* Update sequence of addappt in DG

* Fix sequence of addappt in DG

* Edit AddapptSequenceDiagram

* Fix DG

* Edit ppp

* Update UGDG

* Add screenshots for UG

* Update AddapptSequenceDiagram

* Add addapptactivitydiagram

* Make changes to PPP

* Update DG

* resolve conflict

* Add test instructions in DG

* Edit UG

* Edit UGDGPPP
</commit_message>
<xml_diff>
--- a/docs/diagrams/AddapptSequenceDiagram.pptx
+++ b/docs/diagrams/AddapptSequenceDiagram.pptx
@@ -208,7 +208,7 @@
           <a:p>
             <a:fld id="{F5CC4B3F-88C1-4FFA-B1B6-F41C21DC6924}" type="datetimeFigureOut">
               <a:rPr lang="en-US" smtClean="0"/>
-              <a:t>11/10/2018</a:t>
+              <a:t>11/12/2018</a:t>
             </a:fld>
             <a:endParaRPr lang="en-US"/>
           </a:p>
@@ -738,7 +738,7 @@
           <a:p>
             <a:fld id="{78C97017-6FC3-485B-9764-EAC9E56C1D49}" type="datetimeFigureOut">
               <a:rPr lang="en-US" smtClean="0"/>
-              <a:t>11/10/2018</a:t>
+              <a:t>11/12/2018</a:t>
             </a:fld>
             <a:endParaRPr lang="en-US"/>
           </a:p>
@@ -906,7 +906,7 @@
           <a:p>
             <a:fld id="{78C97017-6FC3-485B-9764-EAC9E56C1D49}" type="datetimeFigureOut">
               <a:rPr lang="en-US" smtClean="0"/>
-              <a:t>11/10/2018</a:t>
+              <a:t>11/12/2018</a:t>
             </a:fld>
             <a:endParaRPr lang="en-US"/>
           </a:p>
@@ -1084,7 +1084,7 @@
           <a:p>
             <a:fld id="{78C97017-6FC3-485B-9764-EAC9E56C1D49}" type="datetimeFigureOut">
               <a:rPr lang="en-US" smtClean="0"/>
-              <a:t>11/10/2018</a:t>
+              <a:t>11/12/2018</a:t>
             </a:fld>
             <a:endParaRPr lang="en-US"/>
           </a:p>
@@ -1252,7 +1252,7 @@
           <a:p>
             <a:fld id="{78C97017-6FC3-485B-9764-EAC9E56C1D49}" type="datetimeFigureOut">
               <a:rPr lang="en-US" smtClean="0"/>
-              <a:t>11/10/2018</a:t>
+              <a:t>11/12/2018</a:t>
             </a:fld>
             <a:endParaRPr lang="en-US"/>
           </a:p>
@@ -1497,7 +1497,7 @@
           <a:p>
             <a:fld id="{78C97017-6FC3-485B-9764-EAC9E56C1D49}" type="datetimeFigureOut">
               <a:rPr lang="en-US" smtClean="0"/>
-              <a:t>11/10/2018</a:t>
+              <a:t>11/12/2018</a:t>
             </a:fld>
             <a:endParaRPr lang="en-US"/>
           </a:p>
@@ -1782,7 +1782,7 @@
           <a:p>
             <a:fld id="{78C97017-6FC3-485B-9764-EAC9E56C1D49}" type="datetimeFigureOut">
               <a:rPr lang="en-US" smtClean="0"/>
-              <a:t>11/10/2018</a:t>
+              <a:t>11/12/2018</a:t>
             </a:fld>
             <a:endParaRPr lang="en-US"/>
           </a:p>
@@ -2201,7 +2201,7 @@
           <a:p>
             <a:fld id="{78C97017-6FC3-485B-9764-EAC9E56C1D49}" type="datetimeFigureOut">
               <a:rPr lang="en-US" smtClean="0"/>
-              <a:t>11/10/2018</a:t>
+              <a:t>11/12/2018</a:t>
             </a:fld>
             <a:endParaRPr lang="en-US"/>
           </a:p>
@@ -2318,7 +2318,7 @@
           <a:p>
             <a:fld id="{78C97017-6FC3-485B-9764-EAC9E56C1D49}" type="datetimeFigureOut">
               <a:rPr lang="en-US" smtClean="0"/>
-              <a:t>11/10/2018</a:t>
+              <a:t>11/12/2018</a:t>
             </a:fld>
             <a:endParaRPr lang="en-US"/>
           </a:p>
@@ -2413,7 +2413,7 @@
           <a:p>
             <a:fld id="{78C97017-6FC3-485B-9764-EAC9E56C1D49}" type="datetimeFigureOut">
               <a:rPr lang="en-US" smtClean="0"/>
-              <a:t>11/10/2018</a:t>
+              <a:t>11/12/2018</a:t>
             </a:fld>
             <a:endParaRPr lang="en-US"/>
           </a:p>
@@ -2688,7 +2688,7 @@
           <a:p>
             <a:fld id="{78C97017-6FC3-485B-9764-EAC9E56C1D49}" type="datetimeFigureOut">
               <a:rPr lang="en-US" smtClean="0"/>
-              <a:t>11/10/2018</a:t>
+              <a:t>11/12/2018</a:t>
             </a:fld>
             <a:endParaRPr lang="en-US"/>
           </a:p>
@@ -2940,7 +2940,7 @@
           <a:p>
             <a:fld id="{78C97017-6FC3-485B-9764-EAC9E56C1D49}" type="datetimeFigureOut">
               <a:rPr lang="en-US" smtClean="0"/>
-              <a:t>11/10/2018</a:t>
+              <a:t>11/12/2018</a:t>
             </a:fld>
             <a:endParaRPr lang="en-US"/>
           </a:p>
@@ -3151,7 +3151,7 @@
           <a:p>
             <a:fld id="{78C97017-6FC3-485B-9764-EAC9E56C1D49}" type="datetimeFigureOut">
               <a:rPr lang="en-US" smtClean="0"/>
-              <a:t>11/10/2018</a:t>
+              <a:t>11/12/2018</a:t>
             </a:fld>
             <a:endParaRPr lang="en-US"/>
           </a:p>
@@ -3534,8 +3534,8 @@
         </p:nvSpPr>
         <p:spPr>
           <a:xfrm>
-            <a:off x="7916308" y="163017"/>
-            <a:ext cx="3818492" cy="5767083"/>
+            <a:off x="9115445" y="163017"/>
+            <a:ext cx="3541827" cy="5830818"/>
           </a:xfrm>
           <a:prstGeom prst="roundRect">
             <a:avLst>
@@ -3595,8 +3595,8 @@
         </p:nvSpPr>
         <p:spPr>
           <a:xfrm>
-            <a:off x="47796" y="163017"/>
-            <a:ext cx="7782903" cy="5746986"/>
+            <a:off x="0" y="163017"/>
+            <a:ext cx="9121779" cy="5830818"/>
           </a:xfrm>
           <a:prstGeom prst="roundRect">
             <a:avLst>
@@ -3850,18 +3850,15 @@
                   <a:schemeClr val="bg1"/>
                 </a:solidFill>
               </a:rPr>
-              <a:t>:Address</a:t>
-            </a:r>
-          </a:p>
-          <a:p>
-            <a:pPr algn="ctr"/>
+              <a:t>:</a:t>
+            </a:r>
             <a:r>
               <a:rPr lang="en-US" sz="1600" dirty="0" err="1">
                 <a:solidFill>
                   <a:schemeClr val="bg1"/>
                 </a:solidFill>
               </a:rPr>
-              <a:t>BookParser</a:t>
+              <a:t>HealthBaseParser</a:t>
             </a:r>
             <a:endParaRPr lang="en-SG" sz="1600" dirty="0">
               <a:solidFill>
@@ -4008,8 +4005,8 @@
         </p:nvSpPr>
         <p:spPr>
           <a:xfrm>
-            <a:off x="5456801" y="1595828"/>
-            <a:ext cx="162711" cy="1080759"/>
+            <a:off x="5449456" y="1905589"/>
+            <a:ext cx="166900" cy="770081"/>
           </a:xfrm>
           <a:prstGeom prst="rect">
             <a:avLst/>
@@ -4159,7 +4156,7 @@
                   <a:srgbClr val="0070C0"/>
                 </a:solidFill>
               </a:rPr>
-              <a:t>/Heart Bypass dt/27-04-19 1030 doc/Dr. Pepper”)</a:t>
+              <a:t>/Heart Bypass dt/27-04-19 10:30 doc/Dr. Pepper”)</a:t>
             </a:r>
           </a:p>
         </p:txBody>
@@ -4174,8 +4171,8 @@
         </p:nvCxnSpPr>
         <p:spPr>
           <a:xfrm>
-            <a:off x="4113158" y="1847956"/>
-            <a:ext cx="1370490" cy="1"/>
+            <a:off x="4112552" y="1927132"/>
+            <a:ext cx="1336904" cy="0"/>
           </a:xfrm>
           <a:prstGeom prst="straightConnector1">
             <a:avLst/>
@@ -4293,7 +4290,7 @@
         </p:nvCxnSpPr>
         <p:spPr>
           <a:xfrm>
-            <a:off x="1660929" y="2833640"/>
+            <a:off x="1660930" y="2838886"/>
             <a:ext cx="2348067" cy="0"/>
           </a:xfrm>
           <a:prstGeom prst="straightConnector1">
@@ -4542,127 +4539,13 @@
       </p:sp>
       <p:sp>
         <p:nvSpPr>
-          <p:cNvPr id="84" name="Rectangle 62"/>
-          <p:cNvSpPr/>
-          <p:nvPr/>
-        </p:nvSpPr>
-        <p:spPr>
-          <a:xfrm>
-            <a:off x="9422067" y="4252564"/>
-            <a:ext cx="2181777" cy="335427"/>
-          </a:xfrm>
-          <a:prstGeom prst="rect">
-            <a:avLst/>
-          </a:prstGeom>
-          <a:solidFill>
-            <a:srgbClr val="7030A0"/>
-          </a:solidFill>
-          <a:ln w="19050">
-            <a:solidFill>
-              <a:srgbClr val="7030A0"/>
-            </a:solidFill>
-          </a:ln>
-          <a:effectLst/>
-        </p:spPr>
-        <p:style>
-          <a:lnRef idx="1">
-            <a:schemeClr val="accent2"/>
-          </a:lnRef>
-          <a:fillRef idx="2">
-            <a:schemeClr val="accent2"/>
-          </a:fillRef>
-          <a:effectRef idx="1">
-            <a:schemeClr val="accent2"/>
-          </a:effectRef>
-          <a:fontRef idx="minor">
-            <a:schemeClr val="dk1"/>
-          </a:fontRef>
-        </p:style>
-        <p:txBody>
-          <a:bodyPr rtlCol="0" anchor="ctr"/>
-          <a:lstStyle/>
-          <a:p>
-            <a:pPr algn="ctr"/>
-            <a:r>
-              <a:rPr lang="en-US" sz="1600" dirty="0">
-                <a:solidFill>
-                  <a:schemeClr val="bg1"/>
-                </a:solidFill>
-              </a:rPr>
-              <a:t>:</a:t>
-            </a:r>
-            <a:r>
-              <a:rPr lang="en-US" sz="1600" dirty="0" err="1">
-                <a:solidFill>
-                  <a:schemeClr val="bg1"/>
-                </a:solidFill>
-              </a:rPr>
-              <a:t>VersionedAddressBook</a:t>
-            </a:r>
-            <a:endParaRPr lang="en-SG" sz="1600" dirty="0">
-              <a:solidFill>
-                <a:schemeClr val="bg1"/>
-              </a:solidFill>
-            </a:endParaRPr>
-          </a:p>
-        </p:txBody>
-      </p:sp>
-      <p:sp>
-        <p:nvSpPr>
-          <p:cNvPr id="86" name="Rectangle 85"/>
-          <p:cNvSpPr/>
-          <p:nvPr/>
-        </p:nvSpPr>
-        <p:spPr>
-          <a:xfrm>
-            <a:off x="10454855" y="4994578"/>
-            <a:ext cx="130250" cy="263220"/>
-          </a:xfrm>
-          <a:prstGeom prst="rect">
-            <a:avLst/>
-          </a:prstGeom>
-          <a:solidFill>
-            <a:srgbClr val="7030A0"/>
-          </a:solidFill>
-          <a:ln>
-            <a:solidFill>
-              <a:srgbClr val="7030A0"/>
-            </a:solidFill>
-          </a:ln>
-          <a:effectLst/>
-        </p:spPr>
-        <p:style>
-          <a:lnRef idx="1">
-            <a:schemeClr val="accent3"/>
-          </a:lnRef>
-          <a:fillRef idx="2">
-            <a:schemeClr val="accent3"/>
-          </a:fillRef>
-          <a:effectRef idx="1">
-            <a:schemeClr val="accent3"/>
-          </a:effectRef>
-          <a:fontRef idx="minor">
-            <a:schemeClr val="dk1"/>
-          </a:fontRef>
-        </p:style>
-        <p:txBody>
-          <a:bodyPr rtlCol="0" anchor="ctr"/>
-          <a:lstStyle/>
-          <a:p>
-            <a:pPr algn="ctr"/>
-            <a:endParaRPr lang="en-SG" sz="1400"/>
-          </a:p>
-        </p:txBody>
-      </p:sp>
-      <p:sp>
-        <p:nvSpPr>
           <p:cNvPr id="93" name="TextBox 92"/>
           <p:cNvSpPr txBox="1"/>
           <p:nvPr/>
         </p:nvSpPr>
         <p:spPr>
           <a:xfrm>
-            <a:off x="2663146" y="2600444"/>
+            <a:off x="2700788" y="2598099"/>
             <a:ext cx="220343" cy="215444"/>
           </a:xfrm>
           <a:prstGeom prst="rect">
@@ -4702,7 +4585,7 @@
         </p:nvSpPr>
         <p:spPr>
           <a:xfrm>
-            <a:off x="8341278" y="2837489"/>
+            <a:off x="9608218" y="2837489"/>
             <a:ext cx="841636" cy="300180"/>
           </a:xfrm>
           <a:prstGeom prst="rect">
@@ -4763,7 +4646,7 @@
         </p:nvCxnSpPr>
         <p:spPr>
           <a:xfrm flipH="1">
-            <a:off x="8726530" y="3120076"/>
+            <a:off x="9993470" y="3120076"/>
             <a:ext cx="8756" cy="2594920"/>
           </a:xfrm>
           <a:prstGeom prst="line">
@@ -4792,53 +4675,6 @@
           </a:fontRef>
         </p:style>
       </p:cxnSp>
-      <p:sp>
-        <p:nvSpPr>
-          <p:cNvPr id="49" name="Rectangle 48"/>
-          <p:cNvSpPr/>
-          <p:nvPr/>
-        </p:nvSpPr>
-        <p:spPr>
-          <a:xfrm>
-            <a:off x="8648967" y="3541191"/>
-            <a:ext cx="172569" cy="398562"/>
-          </a:xfrm>
-          <a:prstGeom prst="rect">
-            <a:avLst/>
-          </a:prstGeom>
-          <a:solidFill>
-            <a:srgbClr val="7030A0"/>
-          </a:solidFill>
-          <a:ln>
-            <a:solidFill>
-              <a:srgbClr val="7030A0"/>
-            </a:solidFill>
-          </a:ln>
-          <a:effectLst/>
-        </p:spPr>
-        <p:style>
-          <a:lnRef idx="1">
-            <a:schemeClr val="accent3"/>
-          </a:lnRef>
-          <a:fillRef idx="2">
-            <a:schemeClr val="accent3"/>
-          </a:fillRef>
-          <a:effectRef idx="1">
-            <a:schemeClr val="accent3"/>
-          </a:effectRef>
-          <a:fontRef idx="minor">
-            <a:schemeClr val="dk1"/>
-          </a:fontRef>
-        </p:style>
-        <p:txBody>
-          <a:bodyPr rtlCol="0" anchor="ctr"/>
-          <a:lstStyle/>
-          <a:p>
-            <a:pPr algn="ctr"/>
-            <a:endParaRPr lang="en-SG" sz="1400"/>
-          </a:p>
-        </p:txBody>
-      </p:sp>
       <p:sp>
         <p:nvSpPr>
           <p:cNvPr id="19" name="Rectangle 62"/>
@@ -5049,51 +4885,6 @@
       </p:cxnSp>
       <p:cxnSp>
         <p:nvCxnSpPr>
-          <p:cNvPr id="89" name="Straight Connector 88">
-            <a:extLst>
-              <a:ext uri="{FF2B5EF4-FFF2-40B4-BE49-F238E27FC236}">
-                <a16:creationId xmlns:a16="http://schemas.microsoft.com/office/drawing/2014/main" id="{E4E1C8CA-49DF-45D8-80A5-D5C8282EE927}"/>
-              </a:ext>
-            </a:extLst>
-          </p:cNvPr>
-          <p:cNvCxnSpPr>
-            <a:cxnSpLocks/>
-          </p:cNvCxnSpPr>
-          <p:nvPr/>
-        </p:nvCxnSpPr>
-        <p:spPr>
-          <a:xfrm>
-            <a:off x="10519825" y="4479081"/>
-            <a:ext cx="9149" cy="1075298"/>
-          </a:xfrm>
-          <a:prstGeom prst="line">
-            <a:avLst/>
-          </a:prstGeom>
-          <a:ln w="19050">
-            <a:solidFill>
-              <a:srgbClr val="7030A0"/>
-            </a:solidFill>
-            <a:prstDash val="sysDash"/>
-          </a:ln>
-          <a:effectLst/>
-        </p:spPr>
-        <p:style>
-          <a:lnRef idx="1">
-            <a:schemeClr val="accent1"/>
-          </a:lnRef>
-          <a:fillRef idx="2">
-            <a:schemeClr val="accent1"/>
-          </a:fillRef>
-          <a:effectRef idx="1">
-            <a:schemeClr val="accent1"/>
-          </a:effectRef>
-          <a:fontRef idx="minor">
-            <a:schemeClr val="dk1"/>
-          </a:fontRef>
-        </p:style>
-      </p:cxnSp>
-      <p:cxnSp>
-        <p:nvCxnSpPr>
           <p:cNvPr id="13" name="Curved Connector 12"/>
           <p:cNvCxnSpPr>
             <a:cxnSpLocks/>
@@ -5133,44 +4924,6 @@
           </a:fontRef>
         </p:style>
       </p:cxnSp>
-      <p:cxnSp>
-        <p:nvCxnSpPr>
-          <p:cNvPr id="52" name="Straight Arrow Connector 51"/>
-          <p:cNvCxnSpPr>
-            <a:cxnSpLocks/>
-          </p:cNvCxnSpPr>
-          <p:nvPr/>
-        </p:nvCxnSpPr>
-        <p:spPr>
-          <a:xfrm>
-            <a:off x="8818751" y="5029200"/>
-            <a:ext cx="1636104" cy="0"/>
-          </a:xfrm>
-          <a:prstGeom prst="straightConnector1">
-            <a:avLst/>
-          </a:prstGeom>
-          <a:ln w="19050">
-            <a:solidFill>
-              <a:srgbClr val="7030A0"/>
-            </a:solidFill>
-            <a:tailEnd type="arrow"/>
-          </a:ln>
-        </p:spPr>
-        <p:style>
-          <a:lnRef idx="1">
-            <a:schemeClr val="accent1"/>
-          </a:lnRef>
-          <a:fillRef idx="0">
-            <a:schemeClr val="accent1"/>
-          </a:fillRef>
-          <a:effectRef idx="0">
-            <a:schemeClr val="accent1"/>
-          </a:effectRef>
-          <a:fontRef idx="minor">
-            <a:schemeClr val="tx1"/>
-          </a:fontRef>
-        </p:style>
-      </p:cxnSp>
       <p:sp>
         <p:nvSpPr>
           <p:cNvPr id="44" name="Rectangle 62">
@@ -5274,7 +5027,7 @@
         </p:nvSpPr>
         <p:spPr>
           <a:xfrm>
-            <a:off x="4142830" y="1619356"/>
+            <a:off x="4213017" y="1733845"/>
             <a:ext cx="1159805" cy="184666"/>
           </a:xfrm>
           <a:prstGeom prst="rect">
@@ -5302,7 +5055,7 @@
             <a:pPr algn="ctr"/>
             <a:r>
               <a:rPr lang="en-US" sz="1200" dirty="0"/>
-              <a:t>parse(“type/…”)</a:t>
+              <a:t>parse(…)</a:t>
             </a:r>
           </a:p>
         </p:txBody>
@@ -5367,7 +5120,7 @@
         </p:nvCxnSpPr>
         <p:spPr>
           <a:xfrm>
-            <a:off x="5637492" y="1991672"/>
+            <a:off x="5616356" y="1987524"/>
             <a:ext cx="958629" cy="0"/>
           </a:xfrm>
           <a:prstGeom prst="straightConnector1">
@@ -5411,8 +5164,8 @@
         </p:nvCxnSpPr>
         <p:spPr>
           <a:xfrm>
-            <a:off x="5533902" y="2032200"/>
-            <a:ext cx="0" cy="926908"/>
+            <a:off x="5532906" y="1600083"/>
+            <a:ext cx="0" cy="1339753"/>
           </a:xfrm>
           <a:prstGeom prst="line">
             <a:avLst/>
@@ -5500,7 +5253,7 @@
         </p:nvSpPr>
         <p:spPr>
           <a:xfrm>
-            <a:off x="4615183" y="2432872"/>
+            <a:off x="4656457" y="2432872"/>
             <a:ext cx="220343" cy="215444"/>
           </a:xfrm>
           <a:prstGeom prst="rect">
@@ -5702,8 +5455,8 @@
         </p:nvSpPr>
         <p:spPr>
           <a:xfrm>
-            <a:off x="7343899" y="4030036"/>
-            <a:ext cx="1474852" cy="153888"/>
+            <a:off x="7388664" y="3922994"/>
+            <a:ext cx="1004331" cy="307777"/>
           </a:xfrm>
           <a:prstGeom prst="rect">
             <a:avLst/>
@@ -5746,7 +5499,7 @@
                   </a:schemeClr>
                 </a:solidFill>
               </a:rPr>
-              <a:t>(…)</a:t>
+              <a:t>(patient, appt)</a:t>
             </a:r>
             <a:endParaRPr lang="en-US" sz="1000" dirty="0"/>
           </a:p>
@@ -5820,7 +5573,7 @@
         </p:nvSpPr>
         <p:spPr>
           <a:xfrm>
-            <a:off x="8631776" y="4922469"/>
+            <a:off x="9898716" y="4922469"/>
             <a:ext cx="183730" cy="414435"/>
           </a:xfrm>
           <a:prstGeom prst="rect">
@@ -5874,9 +5627,9 @@
           <p:nvPr/>
         </p:nvCxnSpPr>
         <p:spPr>
-          <a:xfrm flipV="1">
-            <a:off x="7223406" y="4933268"/>
-            <a:ext cx="1447218" cy="4890"/>
+          <a:xfrm>
+            <a:off x="7223406" y="4938158"/>
+            <a:ext cx="2681644" cy="0"/>
           </a:xfrm>
           <a:prstGeom prst="straightConnector1">
             <a:avLst/>
@@ -5917,7 +5670,7 @@
         </p:nvSpPr>
         <p:spPr>
           <a:xfrm>
-            <a:off x="7169472" y="4718125"/>
+            <a:off x="8271462" y="4717931"/>
             <a:ext cx="1474852" cy="184666"/>
           </a:xfrm>
           <a:prstGeom prst="rect">
@@ -5967,12 +5720,59 @@
           </a:p>
         </p:txBody>
       </p:sp>
-      <p:sp>
-        <p:nvSpPr>
-          <p:cNvPr id="119" name="TextBox 118">
+      <p:cxnSp>
+        <p:nvCxnSpPr>
+          <p:cNvPr id="124" name="Straight Arrow Connector 123">
             <a:extLst>
               <a:ext uri="{FF2B5EF4-FFF2-40B4-BE49-F238E27FC236}">
-                <a16:creationId xmlns:a16="http://schemas.microsoft.com/office/drawing/2014/main" id="{0638170C-8F8E-4534-BF0E-907EF1B947C1}"/>
+                <a16:creationId xmlns:a16="http://schemas.microsoft.com/office/drawing/2014/main" id="{2EC12DEF-0A0B-41B2-974F-8DC94A48A32E}"/>
+              </a:ext>
+            </a:extLst>
+          </p:cNvPr>
+          <p:cNvCxnSpPr>
+            <a:cxnSpLocks/>
+            <a:endCxn id="111" idx="2"/>
+          </p:cNvCxnSpPr>
+          <p:nvPr/>
+        </p:nvCxnSpPr>
+        <p:spPr>
+          <a:xfrm>
+            <a:off x="7226939" y="5336904"/>
+            <a:ext cx="2763642" cy="0"/>
+          </a:xfrm>
+          <a:prstGeom prst="straightConnector1">
+            <a:avLst/>
+          </a:prstGeom>
+          <a:ln w="19050">
+            <a:solidFill>
+              <a:srgbClr val="7030A0"/>
+            </a:solidFill>
+            <a:prstDash val="sysDash"/>
+            <a:headEnd type="arrow" w="med" len="med"/>
+            <a:tailEnd type="none" w="med" len="med"/>
+          </a:ln>
+        </p:spPr>
+        <p:style>
+          <a:lnRef idx="1">
+            <a:schemeClr val="accent1"/>
+          </a:lnRef>
+          <a:fillRef idx="0">
+            <a:schemeClr val="accent1"/>
+          </a:fillRef>
+          <a:effectRef idx="0">
+            <a:schemeClr val="accent1"/>
+          </a:effectRef>
+          <a:fontRef idx="minor">
+            <a:schemeClr val="tx1"/>
+          </a:fontRef>
+        </p:style>
+      </p:cxnSp>
+      <p:sp>
+        <p:nvSpPr>
+          <p:cNvPr id="70" name="TextBox 69">
+            <a:extLst>
+              <a:ext uri="{FF2B5EF4-FFF2-40B4-BE49-F238E27FC236}">
+                <a16:creationId xmlns:a16="http://schemas.microsoft.com/office/drawing/2014/main" id="{C0E8AADE-D5D3-4C7C-9F6E-11C93207DDC3}"/>
               </a:ext>
             </a:extLst>
           </p:cNvPr>
@@ -5981,8 +5781,8 @@
         </p:nvSpPr>
         <p:spPr>
           <a:xfrm>
-            <a:off x="8880168" y="4794339"/>
-            <a:ext cx="1474852" cy="184666"/>
+            <a:off x="7037205" y="3008966"/>
+            <a:ext cx="1474852" cy="461665"/>
           </a:xfrm>
           <a:prstGeom prst="rect">
             <a:avLst/>
@@ -6008,6 +5808,962 @@
           <a:p>
             <a:pPr algn="ctr"/>
             <a:r>
+              <a:rPr lang="en-US" sz="1000" dirty="0">
+                <a:solidFill>
+                  <a:schemeClr val="accent4">
+                    <a:lumMod val="75000"/>
+                  </a:schemeClr>
+                </a:solidFill>
+              </a:rPr>
+              <a:t>&lt;&lt;static&gt;&gt; </a:t>
+            </a:r>
+            <a:r>
+              <a:rPr lang="en-US" sz="1000" dirty="0" err="1">
+                <a:solidFill>
+                  <a:schemeClr val="accent4">
+                    <a:lumMod val="75000"/>
+                  </a:schemeClr>
+                </a:solidFill>
+              </a:rPr>
+              <a:t>getPatient</a:t>
+            </a:r>
+            <a:r>
+              <a:rPr lang="en-US" sz="1000" dirty="0">
+                <a:solidFill>
+                  <a:schemeClr val="accent4">
+                    <a:lumMod val="75000"/>
+                  </a:schemeClr>
+                </a:solidFill>
+              </a:rPr>
+              <a:t>(</a:t>
+            </a:r>
+            <a:r>
+              <a:rPr lang="en-US" sz="1000" dirty="0" err="1">
+                <a:solidFill>
+                  <a:schemeClr val="accent4">
+                    <a:lumMod val="75000"/>
+                  </a:schemeClr>
+                </a:solidFill>
+              </a:rPr>
+              <a:t>patientNric</a:t>
+            </a:r>
+            <a:r>
+              <a:rPr lang="en-US" sz="1000" dirty="0">
+                <a:solidFill>
+                  <a:schemeClr val="accent4">
+                    <a:lumMod val="75000"/>
+                  </a:schemeClr>
+                </a:solidFill>
+              </a:rPr>
+              <a:t>, model)</a:t>
+            </a:r>
+            <a:endParaRPr lang="en-US" sz="1000" dirty="0"/>
+          </a:p>
+        </p:txBody>
+      </p:sp>
+      <p:sp>
+        <p:nvSpPr>
+          <p:cNvPr id="71" name="TextBox 70">
+            <a:extLst>
+              <a:ext uri="{FF2B5EF4-FFF2-40B4-BE49-F238E27FC236}">
+                <a16:creationId xmlns:a16="http://schemas.microsoft.com/office/drawing/2014/main" id="{D4C33435-7FE7-4E09-99CC-C62A2783814F}"/>
+              </a:ext>
+            </a:extLst>
+          </p:cNvPr>
+          <p:cNvSpPr txBox="1"/>
+          <p:nvPr/>
+        </p:nvSpPr>
+        <p:spPr>
+          <a:xfrm>
+            <a:off x="7010400" y="5732225"/>
+            <a:ext cx="258404" cy="261610"/>
+          </a:xfrm>
+          <a:prstGeom prst="rect">
+            <a:avLst/>
+          </a:prstGeom>
+          <a:noFill/>
+        </p:spPr>
+        <p:txBody>
+          <a:bodyPr wrap="none" rtlCol="0">
+            <a:spAutoFit/>
+          </a:bodyPr>
+          <a:lstStyle/>
+          <a:p>
+            <a:r>
+              <a:rPr lang="en-SG" sz="1100" dirty="0">
+                <a:solidFill>
+                  <a:srgbClr val="002060"/>
+                </a:solidFill>
+              </a:rPr>
+              <a:t>X</a:t>
+            </a:r>
+          </a:p>
+        </p:txBody>
+      </p:sp>
+      <p:sp>
+        <p:nvSpPr>
+          <p:cNvPr id="74" name="TextBox 73">
+            <a:extLst>
+              <a:ext uri="{FF2B5EF4-FFF2-40B4-BE49-F238E27FC236}">
+                <a16:creationId xmlns:a16="http://schemas.microsoft.com/office/drawing/2014/main" id="{D70C2ACD-E3FC-47F4-9C31-5A6BAA0E0806}"/>
+              </a:ext>
+            </a:extLst>
+          </p:cNvPr>
+          <p:cNvSpPr txBox="1"/>
+          <p:nvPr/>
+        </p:nvSpPr>
+        <p:spPr>
+          <a:xfrm>
+            <a:off x="5400668" y="2863933"/>
+            <a:ext cx="218844" cy="261610"/>
+          </a:xfrm>
+          <a:prstGeom prst="rect">
+            <a:avLst/>
+          </a:prstGeom>
+          <a:noFill/>
+        </p:spPr>
+        <p:txBody>
+          <a:bodyPr wrap="square" rtlCol="0">
+            <a:spAutoFit/>
+          </a:bodyPr>
+          <a:lstStyle/>
+          <a:p>
+            <a:r>
+              <a:rPr lang="en-SG" sz="1100" dirty="0">
+                <a:solidFill>
+                  <a:srgbClr val="002060"/>
+                </a:solidFill>
+              </a:rPr>
+              <a:t>X</a:t>
+            </a:r>
+          </a:p>
+        </p:txBody>
+      </p:sp>
+      <p:sp>
+        <p:nvSpPr>
+          <p:cNvPr id="72" name="TextBox 71">
+            <a:extLst>
+              <a:ext uri="{FF2B5EF4-FFF2-40B4-BE49-F238E27FC236}">
+                <a16:creationId xmlns:a16="http://schemas.microsoft.com/office/drawing/2014/main" id="{0088772A-2E7D-4729-98DA-1298F1F19D6A}"/>
+              </a:ext>
+            </a:extLst>
+          </p:cNvPr>
+          <p:cNvSpPr txBox="1"/>
+          <p:nvPr/>
+        </p:nvSpPr>
+        <p:spPr>
+          <a:xfrm>
+            <a:off x="7035683" y="3662448"/>
+            <a:ext cx="1474852" cy="153888"/>
+          </a:xfrm>
+          <a:prstGeom prst="rect">
+            <a:avLst/>
+          </a:prstGeom>
+          <a:noFill/>
+        </p:spPr>
+        <p:txBody>
+          <a:bodyPr wrap="square" lIns="0" tIns="0" rIns="0" bIns="0" rtlCol="0">
+            <a:spAutoFit/>
+          </a:bodyPr>
+          <a:lstStyle>
+            <a:defPPr>
+              <a:defRPr lang="en-US"/>
+            </a:defPPr>
+            <a:lvl1pPr algn="r">
+              <a:defRPr sz="1400">
+                <a:solidFill>
+                  <a:srgbClr val="0070C0"/>
+                </a:solidFill>
+              </a:defRPr>
+            </a:lvl1pPr>
+          </a:lstStyle>
+          <a:p>
+            <a:pPr algn="ctr"/>
+            <a:r>
+              <a:rPr lang="en-US" sz="1000" dirty="0" err="1">
+                <a:solidFill>
+                  <a:schemeClr val="accent4">
+                    <a:lumMod val="75000"/>
+                  </a:schemeClr>
+                </a:solidFill>
+              </a:rPr>
+              <a:t>patientToUpdate</a:t>
+            </a:r>
+            <a:endParaRPr lang="en-US" sz="1000" dirty="0"/>
+          </a:p>
+        </p:txBody>
+      </p:sp>
+      <p:sp>
+        <p:nvSpPr>
+          <p:cNvPr id="73" name="TextBox 72">
+            <a:extLst>
+              <a:ext uri="{FF2B5EF4-FFF2-40B4-BE49-F238E27FC236}">
+                <a16:creationId xmlns:a16="http://schemas.microsoft.com/office/drawing/2014/main" id="{1780ECC1-F2B8-4CFE-9F40-4C6C9FBA0402}"/>
+              </a:ext>
+            </a:extLst>
+          </p:cNvPr>
+          <p:cNvSpPr txBox="1"/>
+          <p:nvPr/>
+        </p:nvSpPr>
+        <p:spPr>
+          <a:xfrm rot="632758">
+            <a:off x="7129009" y="4502511"/>
+            <a:ext cx="261610" cy="276999"/>
+          </a:xfrm>
+          <a:prstGeom prst="rect">
+            <a:avLst/>
+          </a:prstGeom>
+          <a:noFill/>
+        </p:spPr>
+        <p:txBody>
+          <a:bodyPr wrap="none" rtlCol="0">
+            <a:spAutoFit/>
+          </a:bodyPr>
+          <a:lstStyle/>
+          <a:p>
+            <a:r>
+              <a:rPr lang="en-SG" sz="1200" b="1" dirty="0"/>
+              <a:t>&lt;</a:t>
+            </a:r>
+          </a:p>
+        </p:txBody>
+      </p:sp>
+      <p:sp>
+        <p:nvSpPr>
+          <p:cNvPr id="3" name="Oval 2">
+            <a:extLst>
+              <a:ext uri="{FF2B5EF4-FFF2-40B4-BE49-F238E27FC236}">
+                <a16:creationId xmlns:a16="http://schemas.microsoft.com/office/drawing/2014/main" id="{39525AC7-8B70-4168-B0B8-674352430DB4}"/>
+              </a:ext>
+            </a:extLst>
+          </p:cNvPr>
+          <p:cNvSpPr/>
+          <p:nvPr/>
+        </p:nvSpPr>
+        <p:spPr>
+          <a:xfrm>
+            <a:off x="840348" y="1037541"/>
+            <a:ext cx="189761" cy="187646"/>
+          </a:xfrm>
+          <a:prstGeom prst="ellipse">
+            <a:avLst/>
+          </a:prstGeom>
+          <a:solidFill>
+            <a:schemeClr val="tx1"/>
+          </a:solidFill>
+          <a:ln>
+            <a:solidFill>
+              <a:schemeClr val="tx1"/>
+            </a:solidFill>
+          </a:ln>
+        </p:spPr>
+        <p:style>
+          <a:lnRef idx="2">
+            <a:schemeClr val="dk1">
+              <a:shade val="50000"/>
+            </a:schemeClr>
+          </a:lnRef>
+          <a:fillRef idx="1">
+            <a:schemeClr val="dk1"/>
+          </a:fillRef>
+          <a:effectRef idx="0">
+            <a:schemeClr val="dk1"/>
+          </a:effectRef>
+          <a:fontRef idx="minor">
+            <a:schemeClr val="lt1"/>
+          </a:fontRef>
+        </p:style>
+        <p:txBody>
+          <a:bodyPr rtlCol="0" anchor="ctr"/>
+          <a:lstStyle/>
+          <a:p>
+            <a:pPr algn="ctr"/>
+            <a:r>
+              <a:rPr lang="en-SG" sz="1050" dirty="0">
+                <a:latin typeface="Arial" panose="020B0604020202020204" pitchFamily="34" charset="0"/>
+                <a:cs typeface="Arial" panose="020B0604020202020204" pitchFamily="34" charset="0"/>
+              </a:rPr>
+              <a:t>1</a:t>
+            </a:r>
+          </a:p>
+        </p:txBody>
+      </p:sp>
+      <p:sp>
+        <p:nvSpPr>
+          <p:cNvPr id="77" name="Oval 76">
+            <a:extLst>
+              <a:ext uri="{FF2B5EF4-FFF2-40B4-BE49-F238E27FC236}">
+                <a16:creationId xmlns:a16="http://schemas.microsoft.com/office/drawing/2014/main" id="{E8AF51D9-CE3C-42CC-BEC7-B8E9B16E9B43}"/>
+              </a:ext>
+            </a:extLst>
+          </p:cNvPr>
+          <p:cNvSpPr/>
+          <p:nvPr/>
+        </p:nvSpPr>
+        <p:spPr>
+          <a:xfrm>
+            <a:off x="2699641" y="1415418"/>
+            <a:ext cx="189761" cy="187646"/>
+          </a:xfrm>
+          <a:prstGeom prst="ellipse">
+            <a:avLst/>
+          </a:prstGeom>
+          <a:solidFill>
+            <a:schemeClr val="tx1"/>
+          </a:solidFill>
+          <a:ln>
+            <a:solidFill>
+              <a:schemeClr val="tx1"/>
+            </a:solidFill>
+          </a:ln>
+        </p:spPr>
+        <p:style>
+          <a:lnRef idx="2">
+            <a:schemeClr val="dk1">
+              <a:shade val="50000"/>
+            </a:schemeClr>
+          </a:lnRef>
+          <a:fillRef idx="1">
+            <a:schemeClr val="dk1"/>
+          </a:fillRef>
+          <a:effectRef idx="0">
+            <a:schemeClr val="dk1"/>
+          </a:effectRef>
+          <a:fontRef idx="minor">
+            <a:schemeClr val="lt1"/>
+          </a:fontRef>
+        </p:style>
+        <p:txBody>
+          <a:bodyPr rtlCol="0" anchor="ctr"/>
+          <a:lstStyle/>
+          <a:p>
+            <a:pPr algn="ctr"/>
+            <a:r>
+              <a:rPr lang="en-SG" sz="1050" dirty="0">
+                <a:latin typeface="Arial" panose="020B0604020202020204" pitchFamily="34" charset="0"/>
+                <a:cs typeface="Arial" panose="020B0604020202020204" pitchFamily="34" charset="0"/>
+              </a:rPr>
+              <a:t>2</a:t>
+            </a:r>
+          </a:p>
+        </p:txBody>
+      </p:sp>
+      <p:sp>
+        <p:nvSpPr>
+          <p:cNvPr id="79" name="Oval 78">
+            <a:extLst>
+              <a:ext uri="{FF2B5EF4-FFF2-40B4-BE49-F238E27FC236}">
+                <a16:creationId xmlns:a16="http://schemas.microsoft.com/office/drawing/2014/main" id="{3FAEC6F4-2638-43EE-A5D7-B1A9F621D68C}"/>
+              </a:ext>
+            </a:extLst>
+          </p:cNvPr>
+          <p:cNvSpPr/>
+          <p:nvPr/>
+        </p:nvSpPr>
+        <p:spPr>
+          <a:xfrm>
+            <a:off x="4687039" y="1969068"/>
+            <a:ext cx="189761" cy="187646"/>
+          </a:xfrm>
+          <a:prstGeom prst="ellipse">
+            <a:avLst/>
+          </a:prstGeom>
+          <a:solidFill>
+            <a:schemeClr val="tx1"/>
+          </a:solidFill>
+          <a:ln>
+            <a:solidFill>
+              <a:schemeClr val="tx1"/>
+            </a:solidFill>
+          </a:ln>
+        </p:spPr>
+        <p:style>
+          <a:lnRef idx="2">
+            <a:schemeClr val="dk1">
+              <a:shade val="50000"/>
+            </a:schemeClr>
+          </a:lnRef>
+          <a:fillRef idx="1">
+            <a:schemeClr val="dk1"/>
+          </a:fillRef>
+          <a:effectRef idx="0">
+            <a:schemeClr val="dk1"/>
+          </a:effectRef>
+          <a:fontRef idx="minor">
+            <a:schemeClr val="lt1"/>
+          </a:fontRef>
+        </p:style>
+        <p:txBody>
+          <a:bodyPr rtlCol="0" anchor="ctr"/>
+          <a:lstStyle/>
+          <a:p>
+            <a:pPr algn="ctr"/>
+            <a:r>
+              <a:rPr lang="en-SG" sz="1050" dirty="0">
+                <a:latin typeface="Arial" panose="020B0604020202020204" pitchFamily="34" charset="0"/>
+                <a:cs typeface="Arial" panose="020B0604020202020204" pitchFamily="34" charset="0"/>
+              </a:rPr>
+              <a:t>3</a:t>
+            </a:r>
+          </a:p>
+        </p:txBody>
+      </p:sp>
+      <p:sp>
+        <p:nvSpPr>
+          <p:cNvPr id="85" name="Oval 84">
+            <a:extLst>
+              <a:ext uri="{FF2B5EF4-FFF2-40B4-BE49-F238E27FC236}">
+                <a16:creationId xmlns:a16="http://schemas.microsoft.com/office/drawing/2014/main" id="{1F01665E-E4AB-4AAF-B54E-B3778239F4AE}"/>
+              </a:ext>
+            </a:extLst>
+          </p:cNvPr>
+          <p:cNvSpPr/>
+          <p:nvPr/>
+        </p:nvSpPr>
+        <p:spPr>
+          <a:xfrm>
+            <a:off x="5978411" y="2035864"/>
+            <a:ext cx="189761" cy="187646"/>
+          </a:xfrm>
+          <a:prstGeom prst="ellipse">
+            <a:avLst/>
+          </a:prstGeom>
+          <a:solidFill>
+            <a:schemeClr val="tx1"/>
+          </a:solidFill>
+          <a:ln>
+            <a:solidFill>
+              <a:schemeClr val="tx1"/>
+            </a:solidFill>
+          </a:ln>
+        </p:spPr>
+        <p:style>
+          <a:lnRef idx="2">
+            <a:schemeClr val="dk1">
+              <a:shade val="50000"/>
+            </a:schemeClr>
+          </a:lnRef>
+          <a:fillRef idx="1">
+            <a:schemeClr val="dk1"/>
+          </a:fillRef>
+          <a:effectRef idx="0">
+            <a:schemeClr val="dk1"/>
+          </a:effectRef>
+          <a:fontRef idx="minor">
+            <a:schemeClr val="lt1"/>
+          </a:fontRef>
+        </p:style>
+        <p:txBody>
+          <a:bodyPr rtlCol="0" anchor="ctr"/>
+          <a:lstStyle/>
+          <a:p>
+            <a:pPr algn="ctr"/>
+            <a:r>
+              <a:rPr lang="en-SG" sz="1050" dirty="0">
+                <a:latin typeface="Arial" panose="020B0604020202020204" pitchFamily="34" charset="0"/>
+                <a:cs typeface="Arial" panose="020B0604020202020204" pitchFamily="34" charset="0"/>
+              </a:rPr>
+              <a:t>4</a:t>
+            </a:r>
+          </a:p>
+        </p:txBody>
+      </p:sp>
+      <p:sp>
+        <p:nvSpPr>
+          <p:cNvPr id="91" name="Oval 90">
+            <a:extLst>
+              <a:ext uri="{FF2B5EF4-FFF2-40B4-BE49-F238E27FC236}">
+                <a16:creationId xmlns:a16="http://schemas.microsoft.com/office/drawing/2014/main" id="{E10110A5-3A3C-4EF8-A966-6F0367104EFB}"/>
+              </a:ext>
+            </a:extLst>
+          </p:cNvPr>
+          <p:cNvSpPr/>
+          <p:nvPr/>
+        </p:nvSpPr>
+        <p:spPr>
+          <a:xfrm>
+            <a:off x="4736956" y="2726157"/>
+            <a:ext cx="189761" cy="187646"/>
+          </a:xfrm>
+          <a:prstGeom prst="ellipse">
+            <a:avLst/>
+          </a:prstGeom>
+          <a:solidFill>
+            <a:schemeClr val="tx1"/>
+          </a:solidFill>
+          <a:ln>
+            <a:solidFill>
+              <a:schemeClr val="tx1"/>
+            </a:solidFill>
+          </a:ln>
+        </p:spPr>
+        <p:style>
+          <a:lnRef idx="2">
+            <a:schemeClr val="dk1">
+              <a:shade val="50000"/>
+            </a:schemeClr>
+          </a:lnRef>
+          <a:fillRef idx="1">
+            <a:schemeClr val="dk1"/>
+          </a:fillRef>
+          <a:effectRef idx="0">
+            <a:schemeClr val="dk1"/>
+          </a:effectRef>
+          <a:fontRef idx="minor">
+            <a:schemeClr val="lt1"/>
+          </a:fontRef>
+        </p:style>
+        <p:txBody>
+          <a:bodyPr rtlCol="0" anchor="ctr"/>
+          <a:lstStyle/>
+          <a:p>
+            <a:pPr algn="ctr"/>
+            <a:r>
+              <a:rPr lang="en-SG" sz="1050" dirty="0">
+                <a:latin typeface="Arial" panose="020B0604020202020204" pitchFamily="34" charset="0"/>
+                <a:cs typeface="Arial" panose="020B0604020202020204" pitchFamily="34" charset="0"/>
+              </a:rPr>
+              <a:t>5</a:t>
+            </a:r>
+          </a:p>
+        </p:txBody>
+      </p:sp>
+      <p:sp>
+        <p:nvSpPr>
+          <p:cNvPr id="92" name="Oval 91">
+            <a:extLst>
+              <a:ext uri="{FF2B5EF4-FFF2-40B4-BE49-F238E27FC236}">
+                <a16:creationId xmlns:a16="http://schemas.microsoft.com/office/drawing/2014/main" id="{032D77AA-749F-4AAE-B9EA-BABA61E9B3CE}"/>
+              </a:ext>
+            </a:extLst>
+          </p:cNvPr>
+          <p:cNvSpPr/>
+          <p:nvPr/>
+        </p:nvSpPr>
+        <p:spPr>
+          <a:xfrm>
+            <a:off x="4113170" y="3409246"/>
+            <a:ext cx="189761" cy="187646"/>
+          </a:xfrm>
+          <a:prstGeom prst="ellipse">
+            <a:avLst/>
+          </a:prstGeom>
+          <a:solidFill>
+            <a:schemeClr val="tx1"/>
+          </a:solidFill>
+          <a:ln>
+            <a:solidFill>
+              <a:schemeClr val="tx1"/>
+            </a:solidFill>
+          </a:ln>
+        </p:spPr>
+        <p:style>
+          <a:lnRef idx="2">
+            <a:schemeClr val="dk1">
+              <a:shade val="50000"/>
+            </a:schemeClr>
+          </a:lnRef>
+          <a:fillRef idx="1">
+            <a:schemeClr val="dk1"/>
+          </a:fillRef>
+          <a:effectRef idx="0">
+            <a:schemeClr val="dk1"/>
+          </a:effectRef>
+          <a:fontRef idx="minor">
+            <a:schemeClr val="lt1"/>
+          </a:fontRef>
+        </p:style>
+        <p:txBody>
+          <a:bodyPr rtlCol="0" anchor="ctr"/>
+          <a:lstStyle/>
+          <a:p>
+            <a:pPr algn="ctr"/>
+            <a:r>
+              <a:rPr lang="en-SG" sz="1050" dirty="0">
+                <a:latin typeface="Arial" panose="020B0604020202020204" pitchFamily="34" charset="0"/>
+                <a:cs typeface="Arial" panose="020B0604020202020204" pitchFamily="34" charset="0"/>
+              </a:rPr>
+              <a:t>6</a:t>
+            </a:r>
+          </a:p>
+        </p:txBody>
+      </p:sp>
+      <p:sp>
+        <p:nvSpPr>
+          <p:cNvPr id="94" name="Oval 93">
+            <a:extLst>
+              <a:ext uri="{FF2B5EF4-FFF2-40B4-BE49-F238E27FC236}">
+                <a16:creationId xmlns:a16="http://schemas.microsoft.com/office/drawing/2014/main" id="{C1A35CA6-7E2D-471F-A140-5BE806232ABF}"/>
+              </a:ext>
+            </a:extLst>
+          </p:cNvPr>
+          <p:cNvSpPr/>
+          <p:nvPr/>
+        </p:nvSpPr>
+        <p:spPr>
+          <a:xfrm>
+            <a:off x="7421875" y="4230771"/>
+            <a:ext cx="189761" cy="187646"/>
+          </a:xfrm>
+          <a:prstGeom prst="ellipse">
+            <a:avLst/>
+          </a:prstGeom>
+          <a:solidFill>
+            <a:schemeClr val="tx1"/>
+          </a:solidFill>
+          <a:ln>
+            <a:solidFill>
+              <a:schemeClr val="tx1"/>
+            </a:solidFill>
+          </a:ln>
+        </p:spPr>
+        <p:style>
+          <a:lnRef idx="2">
+            <a:schemeClr val="dk1">
+              <a:shade val="50000"/>
+            </a:schemeClr>
+          </a:lnRef>
+          <a:fillRef idx="1">
+            <a:schemeClr val="dk1"/>
+          </a:fillRef>
+          <a:effectRef idx="0">
+            <a:schemeClr val="dk1"/>
+          </a:effectRef>
+          <a:fontRef idx="minor">
+            <a:schemeClr val="lt1"/>
+          </a:fontRef>
+        </p:style>
+        <p:txBody>
+          <a:bodyPr rtlCol="0" anchor="ctr"/>
+          <a:lstStyle/>
+          <a:p>
+            <a:pPr algn="ctr"/>
+            <a:r>
+              <a:rPr lang="en-SG" sz="1050" dirty="0">
+                <a:latin typeface="Arial" panose="020B0604020202020204" pitchFamily="34" charset="0"/>
+                <a:cs typeface="Arial" panose="020B0604020202020204" pitchFamily="34" charset="0"/>
+              </a:rPr>
+              <a:t>8</a:t>
+            </a:r>
+          </a:p>
+        </p:txBody>
+      </p:sp>
+      <p:sp>
+        <p:nvSpPr>
+          <p:cNvPr id="95" name="Oval 94">
+            <a:extLst>
+              <a:ext uri="{FF2B5EF4-FFF2-40B4-BE49-F238E27FC236}">
+                <a16:creationId xmlns:a16="http://schemas.microsoft.com/office/drawing/2014/main" id="{30BED30A-280D-445D-B311-00EF2D50D540}"/>
+              </a:ext>
+            </a:extLst>
+          </p:cNvPr>
+          <p:cNvSpPr/>
+          <p:nvPr/>
+        </p:nvSpPr>
+        <p:spPr>
+          <a:xfrm>
+            <a:off x="7671774" y="3483652"/>
+            <a:ext cx="189761" cy="187646"/>
+          </a:xfrm>
+          <a:prstGeom prst="ellipse">
+            <a:avLst/>
+          </a:prstGeom>
+          <a:solidFill>
+            <a:schemeClr val="tx1"/>
+          </a:solidFill>
+          <a:ln>
+            <a:solidFill>
+              <a:schemeClr val="tx1"/>
+            </a:solidFill>
+          </a:ln>
+        </p:spPr>
+        <p:style>
+          <a:lnRef idx="2">
+            <a:schemeClr val="dk1">
+              <a:shade val="50000"/>
+            </a:schemeClr>
+          </a:lnRef>
+          <a:fillRef idx="1">
+            <a:schemeClr val="dk1"/>
+          </a:fillRef>
+          <a:effectRef idx="0">
+            <a:schemeClr val="dk1"/>
+          </a:effectRef>
+          <a:fontRef idx="minor">
+            <a:schemeClr val="lt1"/>
+          </a:fontRef>
+        </p:style>
+        <p:txBody>
+          <a:bodyPr rtlCol="0" anchor="ctr"/>
+          <a:lstStyle/>
+          <a:p>
+            <a:pPr algn="ctr"/>
+            <a:r>
+              <a:rPr lang="en-SG" sz="1050" dirty="0">
+                <a:latin typeface="Arial" panose="020B0604020202020204" pitchFamily="34" charset="0"/>
+                <a:cs typeface="Arial" panose="020B0604020202020204" pitchFamily="34" charset="0"/>
+              </a:rPr>
+              <a:t>7</a:t>
+            </a:r>
+          </a:p>
+        </p:txBody>
+      </p:sp>
+      <p:sp>
+        <p:nvSpPr>
+          <p:cNvPr id="76" name="Rectangle 62">
+            <a:extLst>
+              <a:ext uri="{FF2B5EF4-FFF2-40B4-BE49-F238E27FC236}">
+                <a16:creationId xmlns:a16="http://schemas.microsoft.com/office/drawing/2014/main" id="{16B7A71D-66AD-4D97-A02A-23678F722594}"/>
+              </a:ext>
+            </a:extLst>
+          </p:cNvPr>
+          <p:cNvSpPr/>
+          <p:nvPr/>
+        </p:nvSpPr>
+        <p:spPr>
+          <a:xfrm>
+            <a:off x="11106114" y="4205538"/>
+            <a:ext cx="1466097" cy="335427"/>
+          </a:xfrm>
+          <a:prstGeom prst="rect">
+            <a:avLst/>
+          </a:prstGeom>
+          <a:solidFill>
+            <a:srgbClr val="7030A0"/>
+          </a:solidFill>
+          <a:ln w="19050">
+            <a:solidFill>
+              <a:srgbClr val="7030A0"/>
+            </a:solidFill>
+          </a:ln>
+          <a:effectLst/>
+        </p:spPr>
+        <p:style>
+          <a:lnRef idx="1">
+            <a:schemeClr val="accent2"/>
+          </a:lnRef>
+          <a:fillRef idx="2">
+            <a:schemeClr val="accent2"/>
+          </a:fillRef>
+          <a:effectRef idx="1">
+            <a:schemeClr val="accent2"/>
+          </a:effectRef>
+          <a:fontRef idx="minor">
+            <a:schemeClr val="dk1"/>
+          </a:fontRef>
+        </p:style>
+        <p:txBody>
+          <a:bodyPr rtlCol="0" anchor="ctr"/>
+          <a:lstStyle/>
+          <a:p>
+            <a:pPr algn="ctr"/>
+            <a:r>
+              <a:rPr lang="en-US" sz="1600" dirty="0">
+                <a:solidFill>
+                  <a:schemeClr val="bg1"/>
+                </a:solidFill>
+              </a:rPr>
+              <a:t>:</a:t>
+            </a:r>
+            <a:r>
+              <a:rPr lang="en-US" sz="1600" dirty="0" err="1">
+                <a:solidFill>
+                  <a:schemeClr val="bg1"/>
+                </a:solidFill>
+              </a:rPr>
+              <a:t>HealthBase</a:t>
+            </a:r>
+            <a:endParaRPr lang="en-SG" sz="1600" dirty="0">
+              <a:solidFill>
+                <a:schemeClr val="bg1"/>
+              </a:solidFill>
+            </a:endParaRPr>
+          </a:p>
+        </p:txBody>
+      </p:sp>
+      <p:sp>
+        <p:nvSpPr>
+          <p:cNvPr id="84" name="Rectangle 83">
+            <a:extLst>
+              <a:ext uri="{FF2B5EF4-FFF2-40B4-BE49-F238E27FC236}">
+                <a16:creationId xmlns:a16="http://schemas.microsoft.com/office/drawing/2014/main" id="{661E043B-C9D8-4FEA-9BED-F8A0AF5733C5}"/>
+              </a:ext>
+            </a:extLst>
+          </p:cNvPr>
+          <p:cNvSpPr/>
+          <p:nvPr/>
+        </p:nvSpPr>
+        <p:spPr>
+          <a:xfrm>
+            <a:off x="11770687" y="4968004"/>
+            <a:ext cx="139430" cy="304134"/>
+          </a:xfrm>
+          <a:prstGeom prst="rect">
+            <a:avLst/>
+          </a:prstGeom>
+          <a:solidFill>
+            <a:srgbClr val="7030A0"/>
+          </a:solidFill>
+          <a:ln>
+            <a:solidFill>
+              <a:srgbClr val="7030A0"/>
+            </a:solidFill>
+          </a:ln>
+          <a:effectLst/>
+        </p:spPr>
+        <p:style>
+          <a:lnRef idx="1">
+            <a:schemeClr val="accent3"/>
+          </a:lnRef>
+          <a:fillRef idx="2">
+            <a:schemeClr val="accent3"/>
+          </a:fillRef>
+          <a:effectRef idx="1">
+            <a:schemeClr val="accent3"/>
+          </a:effectRef>
+          <a:fontRef idx="minor">
+            <a:schemeClr val="dk1"/>
+          </a:fontRef>
+        </p:style>
+        <p:txBody>
+          <a:bodyPr rtlCol="0" anchor="ctr"/>
+          <a:lstStyle/>
+          <a:p>
+            <a:pPr algn="ctr"/>
+            <a:endParaRPr lang="en-SG" sz="1400"/>
+          </a:p>
+        </p:txBody>
+      </p:sp>
+      <p:cxnSp>
+        <p:nvCxnSpPr>
+          <p:cNvPr id="86" name="Straight Connector 85">
+            <a:extLst>
+              <a:ext uri="{FF2B5EF4-FFF2-40B4-BE49-F238E27FC236}">
+                <a16:creationId xmlns:a16="http://schemas.microsoft.com/office/drawing/2014/main" id="{A1853F17-E112-41B9-9303-814BDD861B44}"/>
+              </a:ext>
+            </a:extLst>
+          </p:cNvPr>
+          <p:cNvCxnSpPr>
+            <a:cxnSpLocks/>
+          </p:cNvCxnSpPr>
+          <p:nvPr/>
+        </p:nvCxnSpPr>
+        <p:spPr>
+          <a:xfrm>
+            <a:off x="11835657" y="4452507"/>
+            <a:ext cx="9794" cy="1242439"/>
+          </a:xfrm>
+          <a:prstGeom prst="line">
+            <a:avLst/>
+          </a:prstGeom>
+          <a:ln w="19050">
+            <a:solidFill>
+              <a:srgbClr val="7030A0"/>
+            </a:solidFill>
+            <a:prstDash val="sysDash"/>
+          </a:ln>
+          <a:effectLst/>
+        </p:spPr>
+        <p:style>
+          <a:lnRef idx="1">
+            <a:schemeClr val="accent1"/>
+          </a:lnRef>
+          <a:fillRef idx="2">
+            <a:schemeClr val="accent1"/>
+          </a:fillRef>
+          <a:effectRef idx="1">
+            <a:schemeClr val="accent1"/>
+          </a:effectRef>
+          <a:fontRef idx="minor">
+            <a:schemeClr val="dk1"/>
+          </a:fontRef>
+        </p:style>
+      </p:cxnSp>
+      <p:cxnSp>
+        <p:nvCxnSpPr>
+          <p:cNvPr id="89" name="Straight Arrow Connector 88">
+            <a:extLst>
+              <a:ext uri="{FF2B5EF4-FFF2-40B4-BE49-F238E27FC236}">
+                <a16:creationId xmlns:a16="http://schemas.microsoft.com/office/drawing/2014/main" id="{AAF7722D-A0BF-4777-9973-0F6336AEF959}"/>
+              </a:ext>
+            </a:extLst>
+          </p:cNvPr>
+          <p:cNvCxnSpPr>
+            <a:cxnSpLocks/>
+          </p:cNvCxnSpPr>
+          <p:nvPr/>
+        </p:nvCxnSpPr>
+        <p:spPr>
+          <a:xfrm>
+            <a:off x="10134583" y="5002626"/>
+            <a:ext cx="1636104" cy="0"/>
+          </a:xfrm>
+          <a:prstGeom prst="straightConnector1">
+            <a:avLst/>
+          </a:prstGeom>
+          <a:ln w="19050">
+            <a:solidFill>
+              <a:srgbClr val="7030A0"/>
+            </a:solidFill>
+            <a:tailEnd type="arrow"/>
+          </a:ln>
+        </p:spPr>
+        <p:style>
+          <a:lnRef idx="1">
+            <a:schemeClr val="accent1"/>
+          </a:lnRef>
+          <a:fillRef idx="0">
+            <a:schemeClr val="accent1"/>
+          </a:fillRef>
+          <a:effectRef idx="0">
+            <a:schemeClr val="accent1"/>
+          </a:effectRef>
+          <a:fontRef idx="minor">
+            <a:schemeClr val="tx1"/>
+          </a:fontRef>
+        </p:style>
+      </p:cxnSp>
+      <p:sp>
+        <p:nvSpPr>
+          <p:cNvPr id="90" name="TextBox 89">
+            <a:extLst>
+              <a:ext uri="{FF2B5EF4-FFF2-40B4-BE49-F238E27FC236}">
+                <a16:creationId xmlns:a16="http://schemas.microsoft.com/office/drawing/2014/main" id="{C74CEB75-0A9F-423E-B2A3-5280BC811618}"/>
+              </a:ext>
+            </a:extLst>
+          </p:cNvPr>
+          <p:cNvSpPr txBox="1"/>
+          <p:nvPr/>
+        </p:nvSpPr>
+        <p:spPr>
+          <a:xfrm>
+            <a:off x="10196000" y="4767765"/>
+            <a:ext cx="1474852" cy="184666"/>
+          </a:xfrm>
+          <a:prstGeom prst="rect">
+            <a:avLst/>
+          </a:prstGeom>
+          <a:noFill/>
+        </p:spPr>
+        <p:txBody>
+          <a:bodyPr wrap="square" lIns="0" tIns="0" rIns="0" bIns="0" rtlCol="0">
+            <a:spAutoFit/>
+          </a:bodyPr>
+          <a:lstStyle>
+            <a:defPPr>
+              <a:defRPr lang="en-US"/>
+            </a:defPPr>
+            <a:lvl1pPr algn="r">
+              <a:defRPr sz="1400">
+                <a:solidFill>
+                  <a:srgbClr val="0070C0"/>
+                </a:solidFill>
+              </a:defRPr>
+            </a:lvl1pPr>
+          </a:lstStyle>
+          <a:p>
+            <a:pPr algn="ctr"/>
+            <a:r>
               <a:rPr lang="en-US" sz="1200" dirty="0" err="1">
                 <a:solidFill>
                   <a:schemeClr val="accent4">
@@ -6033,10 +6789,10 @@
       </p:sp>
       <p:cxnSp>
         <p:nvCxnSpPr>
-          <p:cNvPr id="122" name="Straight Arrow Connector 121">
+          <p:cNvPr id="96" name="Straight Arrow Connector 95">
             <a:extLst>
               <a:ext uri="{FF2B5EF4-FFF2-40B4-BE49-F238E27FC236}">
-                <a16:creationId xmlns:a16="http://schemas.microsoft.com/office/drawing/2014/main" id="{765B08E1-EE60-4FAC-B62B-ED7D2DD98059}"/>
+                <a16:creationId xmlns:a16="http://schemas.microsoft.com/office/drawing/2014/main" id="{BB2A28CE-A97A-4C1A-AB49-0247B0F4E5FA}"/>
               </a:ext>
             </a:extLst>
           </p:cNvPr>
@@ -6047,7 +6803,7 @@
         </p:nvCxnSpPr>
         <p:spPr>
           <a:xfrm>
-            <a:off x="8786792" y="5247368"/>
+            <a:off x="10102624" y="5264992"/>
             <a:ext cx="1668063" cy="10430"/>
           </a:xfrm>
           <a:prstGeom prst="straightConnector1">
@@ -6060,6 +6816,274 @@
             <a:prstDash val="sysDash"/>
             <a:headEnd type="arrow" w="med" len="med"/>
             <a:tailEnd type="none" w="med" len="med"/>
+          </a:ln>
+        </p:spPr>
+        <p:style>
+          <a:lnRef idx="1">
+            <a:schemeClr val="accent1"/>
+          </a:lnRef>
+          <a:fillRef idx="0">
+            <a:schemeClr val="accent1"/>
+          </a:fillRef>
+          <a:effectRef idx="0">
+            <a:schemeClr val="accent1"/>
+          </a:effectRef>
+          <a:fontRef idx="minor">
+            <a:schemeClr val="tx1"/>
+          </a:fontRef>
+        </p:style>
+      </p:cxnSp>
+      <p:sp>
+        <p:nvSpPr>
+          <p:cNvPr id="97" name="Rectangle 62">
+            <a:extLst>
+              <a:ext uri="{FF2B5EF4-FFF2-40B4-BE49-F238E27FC236}">
+                <a16:creationId xmlns:a16="http://schemas.microsoft.com/office/drawing/2014/main" id="{174BC399-CD89-48D2-AC6E-159663EB0AAB}"/>
+              </a:ext>
+            </a:extLst>
+          </p:cNvPr>
+          <p:cNvSpPr/>
+          <p:nvPr/>
+        </p:nvSpPr>
+        <p:spPr>
+          <a:xfrm>
+            <a:off x="7868542" y="1412437"/>
+            <a:ext cx="1093635" cy="673317"/>
+          </a:xfrm>
+          <a:prstGeom prst="rect">
+            <a:avLst/>
+          </a:prstGeom>
+          <a:solidFill>
+            <a:srgbClr val="0070C0"/>
+          </a:solidFill>
+          <a:ln w="19050">
+            <a:solidFill>
+              <a:srgbClr val="0070C0"/>
+            </a:solidFill>
+          </a:ln>
+          <a:effectLst/>
+        </p:spPr>
+        <p:style>
+          <a:lnRef idx="1">
+            <a:schemeClr val="accent2"/>
+          </a:lnRef>
+          <a:fillRef idx="2">
+            <a:schemeClr val="accent2"/>
+          </a:fillRef>
+          <a:effectRef idx="1">
+            <a:schemeClr val="accent2"/>
+          </a:effectRef>
+          <a:fontRef idx="minor">
+            <a:schemeClr val="dk1"/>
+          </a:fontRef>
+        </p:style>
+        <p:txBody>
+          <a:bodyPr rtlCol="0" anchor="ctr"/>
+          <a:lstStyle/>
+          <a:p>
+            <a:pPr algn="ctr"/>
+            <a:r>
+              <a:rPr lang="en-US" sz="1600" dirty="0">
+                <a:solidFill>
+                  <a:schemeClr val="bg1"/>
+                </a:solidFill>
+              </a:rPr>
+              <a:t>&lt;&lt;class&gt;&gt; </a:t>
+            </a:r>
+            <a:r>
+              <a:rPr lang="en-US" sz="1600" dirty="0" err="1">
+                <a:solidFill>
+                  <a:schemeClr val="bg1"/>
+                </a:solidFill>
+              </a:rPr>
+              <a:t>CommandUtil</a:t>
+            </a:r>
+            <a:endParaRPr lang="en-SG" sz="1600" dirty="0">
+              <a:solidFill>
+                <a:schemeClr val="bg1"/>
+              </a:solidFill>
+            </a:endParaRPr>
+          </a:p>
+        </p:txBody>
+      </p:sp>
+      <p:sp>
+        <p:nvSpPr>
+          <p:cNvPr id="99" name="Rectangle 98">
+            <a:extLst>
+              <a:ext uri="{FF2B5EF4-FFF2-40B4-BE49-F238E27FC236}">
+                <a16:creationId xmlns:a16="http://schemas.microsoft.com/office/drawing/2014/main" id="{F0D9A321-495A-4850-BAC4-35FDB3E52F13}"/>
+              </a:ext>
+            </a:extLst>
+          </p:cNvPr>
+          <p:cNvSpPr/>
+          <p:nvPr/>
+        </p:nvSpPr>
+        <p:spPr>
+          <a:xfrm>
+            <a:off x="5452888" y="1600581"/>
+            <a:ext cx="166900" cy="134015"/>
+          </a:xfrm>
+          <a:prstGeom prst="rect">
+            <a:avLst/>
+          </a:prstGeom>
+          <a:solidFill>
+            <a:srgbClr val="0070C0"/>
+          </a:solidFill>
+          <a:ln>
+            <a:solidFill>
+              <a:srgbClr val="0070C0"/>
+            </a:solidFill>
+          </a:ln>
+          <a:effectLst/>
+        </p:spPr>
+        <p:style>
+          <a:lnRef idx="1">
+            <a:schemeClr val="accent3"/>
+          </a:lnRef>
+          <a:fillRef idx="2">
+            <a:schemeClr val="accent3"/>
+          </a:fillRef>
+          <a:effectRef idx="1">
+            <a:schemeClr val="accent3"/>
+          </a:effectRef>
+          <a:fontRef idx="minor">
+            <a:schemeClr val="dk1"/>
+          </a:fontRef>
+        </p:style>
+        <p:txBody>
+          <a:bodyPr rtlCol="0" anchor="ctr"/>
+          <a:lstStyle/>
+          <a:p>
+            <a:pPr algn="ctr"/>
+            <a:endParaRPr lang="en-SG" sz="1400"/>
+          </a:p>
+        </p:txBody>
+      </p:sp>
+      <p:cxnSp>
+        <p:nvCxnSpPr>
+          <p:cNvPr id="100" name="Straight Connector 99">
+            <a:extLst>
+              <a:ext uri="{FF2B5EF4-FFF2-40B4-BE49-F238E27FC236}">
+                <a16:creationId xmlns:a16="http://schemas.microsoft.com/office/drawing/2014/main" id="{DA3ABCAD-EBDE-461F-B793-B18B532FB2E6}"/>
+              </a:ext>
+            </a:extLst>
+          </p:cNvPr>
+          <p:cNvCxnSpPr>
+            <a:cxnSpLocks/>
+          </p:cNvCxnSpPr>
+          <p:nvPr/>
+        </p:nvCxnSpPr>
+        <p:spPr>
+          <a:xfrm flipH="1">
+            <a:off x="8405273" y="2102347"/>
+            <a:ext cx="10086" cy="3688853"/>
+          </a:xfrm>
+          <a:prstGeom prst="line">
+            <a:avLst/>
+          </a:prstGeom>
+          <a:ln w="19050">
+            <a:solidFill>
+              <a:srgbClr val="0070C0"/>
+            </a:solidFill>
+            <a:prstDash val="sysDash"/>
+          </a:ln>
+          <a:effectLst/>
+        </p:spPr>
+        <p:style>
+          <a:lnRef idx="1">
+            <a:schemeClr val="accent1"/>
+          </a:lnRef>
+          <a:fillRef idx="2">
+            <a:schemeClr val="accent1"/>
+          </a:fillRef>
+          <a:effectRef idx="1">
+            <a:schemeClr val="accent1"/>
+          </a:effectRef>
+          <a:fontRef idx="minor">
+            <a:schemeClr val="dk1"/>
+          </a:fontRef>
+        </p:style>
+      </p:cxnSp>
+      <p:sp>
+        <p:nvSpPr>
+          <p:cNvPr id="101" name="Rectangle 100">
+            <a:extLst>
+              <a:ext uri="{FF2B5EF4-FFF2-40B4-BE49-F238E27FC236}">
+                <a16:creationId xmlns:a16="http://schemas.microsoft.com/office/drawing/2014/main" id="{7DE8D4FF-87EA-4C4C-AA2C-C3ECBFD76648}"/>
+              </a:ext>
+            </a:extLst>
+          </p:cNvPr>
+          <p:cNvSpPr/>
+          <p:nvPr/>
+        </p:nvSpPr>
+        <p:spPr>
+          <a:xfrm>
+            <a:off x="8313220" y="3460847"/>
+            <a:ext cx="175295" cy="374775"/>
+          </a:xfrm>
+          <a:prstGeom prst="rect">
+            <a:avLst/>
+          </a:prstGeom>
+          <a:solidFill>
+            <a:srgbClr val="0070C0"/>
+          </a:solidFill>
+          <a:ln>
+            <a:solidFill>
+              <a:srgbClr val="0070C0"/>
+            </a:solidFill>
+          </a:ln>
+          <a:effectLst/>
+        </p:spPr>
+        <p:style>
+          <a:lnRef idx="1">
+            <a:schemeClr val="accent3"/>
+          </a:lnRef>
+          <a:fillRef idx="2">
+            <a:schemeClr val="accent3"/>
+          </a:fillRef>
+          <a:effectRef idx="1">
+            <a:schemeClr val="accent3"/>
+          </a:effectRef>
+          <a:fontRef idx="minor">
+            <a:schemeClr val="dk1"/>
+          </a:fontRef>
+        </p:style>
+        <p:txBody>
+          <a:bodyPr rtlCol="0" anchor="ctr"/>
+          <a:lstStyle/>
+          <a:p>
+            <a:pPr algn="ctr"/>
+            <a:endParaRPr lang="en-SG" sz="1400"/>
+          </a:p>
+        </p:txBody>
+      </p:sp>
+      <p:cxnSp>
+        <p:nvCxnSpPr>
+          <p:cNvPr id="102" name="Straight Arrow Connector 101">
+            <a:extLst>
+              <a:ext uri="{FF2B5EF4-FFF2-40B4-BE49-F238E27FC236}">
+                <a16:creationId xmlns:a16="http://schemas.microsoft.com/office/drawing/2014/main" id="{5723B395-4DE6-4CE7-B777-2C8C72110AE9}"/>
+              </a:ext>
+            </a:extLst>
+          </p:cNvPr>
+          <p:cNvCxnSpPr>
+            <a:cxnSpLocks/>
+          </p:cNvCxnSpPr>
+          <p:nvPr/>
+        </p:nvCxnSpPr>
+        <p:spPr>
+          <a:xfrm>
+            <a:off x="7216186" y="3468522"/>
+            <a:ext cx="1113846" cy="0"/>
+          </a:xfrm>
+          <a:prstGeom prst="straightConnector1">
+            <a:avLst/>
+          </a:prstGeom>
+          <a:ln w="19050">
+            <a:solidFill>
+              <a:srgbClr val="0070C0"/>
+            </a:solidFill>
+            <a:tailEnd type="arrow"/>
           </a:ln>
         </p:spPr>
         <p:style>
@@ -6079,30 +7103,29 @@
       </p:cxnSp>
       <p:cxnSp>
         <p:nvCxnSpPr>
-          <p:cNvPr id="124" name="Straight Arrow Connector 123">
+          <p:cNvPr id="103" name="Straight Arrow Connector 102">
             <a:extLst>
               <a:ext uri="{FF2B5EF4-FFF2-40B4-BE49-F238E27FC236}">
-                <a16:creationId xmlns:a16="http://schemas.microsoft.com/office/drawing/2014/main" id="{2EC12DEF-0A0B-41B2-974F-8DC94A48A32E}"/>
+                <a16:creationId xmlns:a16="http://schemas.microsoft.com/office/drawing/2014/main" id="{F7C9D219-381F-4E91-8D8D-2752AB31058A}"/>
               </a:ext>
             </a:extLst>
           </p:cNvPr>
           <p:cNvCxnSpPr>
             <a:cxnSpLocks/>
-            <a:endCxn id="111" idx="2"/>
           </p:cNvCxnSpPr>
           <p:nvPr/>
         </p:nvCxnSpPr>
         <p:spPr>
-          <a:xfrm>
-            <a:off x="7209406" y="5326474"/>
-            <a:ext cx="1514235" cy="10430"/>
+          <a:xfrm flipV="1">
+            <a:off x="7220439" y="3831036"/>
+            <a:ext cx="1108185" cy="8410"/>
           </a:xfrm>
           <a:prstGeom prst="straightConnector1">
             <a:avLst/>
           </a:prstGeom>
           <a:ln w="19050">
             <a:solidFill>
-              <a:srgbClr val="7030A0"/>
+              <a:srgbClr val="0070C0"/>
             </a:solidFill>
             <a:prstDash val="sysDash"/>
             <a:headEnd type="arrow" w="med" len="med"/>
@@ -6126,160 +7149,10 @@
       </p:cxnSp>
       <p:sp>
         <p:nvSpPr>
-          <p:cNvPr id="60" name="Rectangle 59">
+          <p:cNvPr id="106" name="TextBox 105">
             <a:extLst>
               <a:ext uri="{FF2B5EF4-FFF2-40B4-BE49-F238E27FC236}">
-                <a16:creationId xmlns:a16="http://schemas.microsoft.com/office/drawing/2014/main" id="{9694B1EA-CF88-4A86-A9E7-E0908BA56634}"/>
-              </a:ext>
-            </a:extLst>
-          </p:cNvPr>
-          <p:cNvSpPr/>
-          <p:nvPr/>
-        </p:nvSpPr>
-        <p:spPr>
-          <a:xfrm>
-            <a:off x="7160246" y="3598626"/>
-            <a:ext cx="183653" cy="184665"/>
-          </a:xfrm>
-          <a:prstGeom prst="rect">
-            <a:avLst/>
-          </a:prstGeom>
-          <a:solidFill>
-            <a:srgbClr val="0070C0"/>
-          </a:solidFill>
-          <a:ln>
-            <a:solidFill>
-              <a:srgbClr val="0070C0"/>
-            </a:solidFill>
-          </a:ln>
-          <a:effectLst/>
-        </p:spPr>
-        <p:style>
-          <a:lnRef idx="1">
-            <a:schemeClr val="accent3"/>
-          </a:lnRef>
-          <a:fillRef idx="2">
-            <a:schemeClr val="accent3"/>
-          </a:fillRef>
-          <a:effectRef idx="1">
-            <a:schemeClr val="accent3"/>
-          </a:effectRef>
-          <a:fontRef idx="minor">
-            <a:schemeClr val="dk1"/>
-          </a:fontRef>
-        </p:style>
-        <p:txBody>
-          <a:bodyPr rtlCol="0" anchor="ctr"/>
-          <a:lstStyle/>
-          <a:p>
-            <a:pPr algn="ctr"/>
-            <a:endParaRPr lang="en-SG" sz="1400"/>
-          </a:p>
-        </p:txBody>
-      </p:sp>
-      <p:cxnSp>
-        <p:nvCxnSpPr>
-          <p:cNvPr id="62" name="Curved Connector 12">
-            <a:extLst>
-              <a:ext uri="{FF2B5EF4-FFF2-40B4-BE49-F238E27FC236}">
-                <a16:creationId xmlns:a16="http://schemas.microsoft.com/office/drawing/2014/main" id="{38A7DDB3-33B2-45A3-AAC8-33DD6EC4CD19}"/>
-              </a:ext>
-            </a:extLst>
-          </p:cNvPr>
-          <p:cNvCxnSpPr>
-            <a:cxnSpLocks/>
-          </p:cNvCxnSpPr>
-          <p:nvPr/>
-        </p:nvCxnSpPr>
-        <p:spPr>
-          <a:xfrm rot="16200000" flipH="1">
-            <a:off x="7199292" y="3503091"/>
-            <a:ext cx="156923" cy="76200"/>
-          </a:xfrm>
-          <a:prstGeom prst="curvedConnector4">
-            <a:avLst>
-              <a:gd name="adj1" fmla="val -32706"/>
-              <a:gd name="adj2" fmla="val 289797"/>
-            </a:avLst>
-          </a:prstGeom>
-          <a:ln>
-            <a:solidFill>
-              <a:srgbClr val="7030A0"/>
-            </a:solidFill>
-            <a:tailEnd type="triangle"/>
-          </a:ln>
-        </p:spPr>
-        <p:style>
-          <a:lnRef idx="1">
-            <a:schemeClr val="accent1"/>
-          </a:lnRef>
-          <a:fillRef idx="0">
-            <a:schemeClr val="accent1"/>
-          </a:fillRef>
-          <a:effectRef idx="0">
-            <a:schemeClr val="accent1"/>
-          </a:effectRef>
-          <a:fontRef idx="minor">
-            <a:schemeClr val="tx1"/>
-          </a:fontRef>
-        </p:style>
-      </p:cxnSp>
-      <p:cxnSp>
-        <p:nvCxnSpPr>
-          <p:cNvPr id="68" name="Connector: Curved 67">
-            <a:extLst>
-              <a:ext uri="{FF2B5EF4-FFF2-40B4-BE49-F238E27FC236}">
-                <a16:creationId xmlns:a16="http://schemas.microsoft.com/office/drawing/2014/main" id="{8395EFBD-B8DC-4C11-A85D-EEEE58EB2FC3}"/>
-              </a:ext>
-            </a:extLst>
-          </p:cNvPr>
-          <p:cNvCxnSpPr>
-            <a:cxnSpLocks/>
-          </p:cNvCxnSpPr>
-          <p:nvPr/>
-        </p:nvCxnSpPr>
-        <p:spPr>
-          <a:xfrm flipH="1">
-            <a:off x="7226227" y="3710534"/>
-            <a:ext cx="131954" cy="199987"/>
-          </a:xfrm>
-          <a:prstGeom prst="curvedConnector4">
-            <a:avLst>
-              <a:gd name="adj1" fmla="val -53034"/>
-              <a:gd name="adj2" fmla="val 101078"/>
-            </a:avLst>
-          </a:prstGeom>
-          <a:ln w="9525" cap="flat" cmpd="sng" algn="ctr">
-            <a:solidFill>
-              <a:schemeClr val="dk1"/>
-            </a:solidFill>
-            <a:prstDash val="dash"/>
-            <a:round/>
-            <a:headEnd type="none" w="med" len="med"/>
-            <a:tailEnd type="none" w="med" len="med"/>
-          </a:ln>
-        </p:spPr>
-        <p:style>
-          <a:lnRef idx="0">
-            <a:scrgbClr r="0" g="0" b="0"/>
-          </a:lnRef>
-          <a:fillRef idx="0">
-            <a:scrgbClr r="0" g="0" b="0"/>
-          </a:fillRef>
-          <a:effectRef idx="0">
-            <a:scrgbClr r="0" g="0" b="0"/>
-          </a:effectRef>
-          <a:fontRef idx="minor">
-            <a:schemeClr val="tx1"/>
-          </a:fontRef>
-        </p:style>
-      </p:cxnSp>
-      <p:sp>
-        <p:nvSpPr>
-          <p:cNvPr id="70" name="TextBox 69">
-            <a:extLst>
-              <a:ext uri="{FF2B5EF4-FFF2-40B4-BE49-F238E27FC236}">
-                <a16:creationId xmlns:a16="http://schemas.microsoft.com/office/drawing/2014/main" id="{C0E8AADE-D5D3-4C7C-9F6E-11C93207DDC3}"/>
+                <a16:creationId xmlns:a16="http://schemas.microsoft.com/office/drawing/2014/main" id="{88CA4FF7-9757-41C6-97EB-99AC7515622A}"/>
               </a:ext>
             </a:extLst>
           </p:cNvPr>
@@ -6288,8 +7161,8 @@
         </p:nvSpPr>
         <p:spPr>
           <a:xfrm>
-            <a:off x="7211948" y="3275112"/>
-            <a:ext cx="1474852" cy="153888"/>
+            <a:off x="5510090" y="1782002"/>
+            <a:ext cx="1159805" cy="184666"/>
           </a:xfrm>
           <a:prstGeom prst="rect">
             <a:avLst/>
@@ -6315,35 +7188,195 @@
           <a:p>
             <a:pPr algn="ctr"/>
             <a:r>
-              <a:rPr lang="en-US" sz="1000" dirty="0" err="1">
-                <a:solidFill>
-                  <a:schemeClr val="accent4">
-                    <a:lumMod val="75000"/>
-                  </a:schemeClr>
-                </a:solidFill>
-              </a:rPr>
-              <a:t>getPatientByPatientNric</a:t>
-            </a:r>
-            <a:r>
-              <a:rPr lang="en-US" sz="1000" dirty="0">
-                <a:solidFill>
-                  <a:schemeClr val="accent4">
-                    <a:lumMod val="75000"/>
-                  </a:schemeClr>
-                </a:solidFill>
-              </a:rPr>
-              <a:t>(…)</a:t>
-            </a:r>
-            <a:endParaRPr lang="en-US" sz="1000" dirty="0"/>
-          </a:p>
-        </p:txBody>
-      </p:sp>
-      <p:sp>
-        <p:nvSpPr>
-          <p:cNvPr id="71" name="TextBox 70">
+              <a:rPr lang="en-US" sz="1200" dirty="0"/>
+              <a:t>parse(…)</a:t>
+            </a:r>
+          </a:p>
+        </p:txBody>
+      </p:sp>
+      <p:sp>
+        <p:nvSpPr>
+          <p:cNvPr id="108" name="Oval 107">
             <a:extLst>
               <a:ext uri="{FF2B5EF4-FFF2-40B4-BE49-F238E27FC236}">
-                <a16:creationId xmlns:a16="http://schemas.microsoft.com/office/drawing/2014/main" id="{D4C33435-7FE7-4E09-99CC-C62A2783814F}"/>
+                <a16:creationId xmlns:a16="http://schemas.microsoft.com/office/drawing/2014/main" id="{913BFC94-2085-417E-B8E5-5E1A9CF182BF}"/>
+              </a:ext>
+            </a:extLst>
+          </p:cNvPr>
+          <p:cNvSpPr/>
+          <p:nvPr/>
+        </p:nvSpPr>
+        <p:spPr>
+          <a:xfrm>
+            <a:off x="2786159" y="2886856"/>
+            <a:ext cx="189761" cy="187646"/>
+          </a:xfrm>
+          <a:prstGeom prst="ellipse">
+            <a:avLst/>
+          </a:prstGeom>
+          <a:solidFill>
+            <a:schemeClr val="tx1"/>
+          </a:solidFill>
+          <a:ln>
+            <a:solidFill>
+              <a:schemeClr val="tx1"/>
+            </a:solidFill>
+          </a:ln>
+        </p:spPr>
+        <p:style>
+          <a:lnRef idx="2">
+            <a:schemeClr val="dk1">
+              <a:shade val="50000"/>
+            </a:schemeClr>
+          </a:lnRef>
+          <a:fillRef idx="1">
+            <a:schemeClr val="dk1"/>
+          </a:fillRef>
+          <a:effectRef idx="0">
+            <a:schemeClr val="dk1"/>
+          </a:effectRef>
+          <a:fontRef idx="minor">
+            <a:schemeClr val="lt1"/>
+          </a:fontRef>
+        </p:style>
+        <p:txBody>
+          <a:bodyPr rtlCol="0" anchor="ctr"/>
+          <a:lstStyle/>
+          <a:p>
+            <a:pPr algn="ctr"/>
+            <a:r>
+              <a:rPr lang="en-SG" sz="1050" dirty="0">
+                <a:latin typeface="Arial" panose="020B0604020202020204" pitchFamily="34" charset="0"/>
+                <a:cs typeface="Arial" panose="020B0604020202020204" pitchFamily="34" charset="0"/>
+              </a:rPr>
+              <a:t>5</a:t>
+            </a:r>
+          </a:p>
+        </p:txBody>
+      </p:sp>
+      <p:sp>
+        <p:nvSpPr>
+          <p:cNvPr id="110" name="Oval 109">
+            <a:extLst>
+              <a:ext uri="{FF2B5EF4-FFF2-40B4-BE49-F238E27FC236}">
+                <a16:creationId xmlns:a16="http://schemas.microsoft.com/office/drawing/2014/main" id="{11500EE6-9F8E-4F1A-92FE-CA6D880C6586}"/>
+              </a:ext>
+            </a:extLst>
+          </p:cNvPr>
+          <p:cNvSpPr/>
+          <p:nvPr/>
+        </p:nvSpPr>
+        <p:spPr>
+          <a:xfrm>
+            <a:off x="8595004" y="4968910"/>
+            <a:ext cx="189761" cy="187646"/>
+          </a:xfrm>
+          <a:prstGeom prst="ellipse">
+            <a:avLst/>
+          </a:prstGeom>
+          <a:solidFill>
+            <a:schemeClr val="tx1"/>
+          </a:solidFill>
+          <a:ln>
+            <a:solidFill>
+              <a:schemeClr val="tx1"/>
+            </a:solidFill>
+          </a:ln>
+        </p:spPr>
+        <p:style>
+          <a:lnRef idx="2">
+            <a:schemeClr val="dk1">
+              <a:shade val="50000"/>
+            </a:schemeClr>
+          </a:lnRef>
+          <a:fillRef idx="1">
+            <a:schemeClr val="dk1"/>
+          </a:fillRef>
+          <a:effectRef idx="0">
+            <a:schemeClr val="dk1"/>
+          </a:effectRef>
+          <a:fontRef idx="minor">
+            <a:schemeClr val="lt1"/>
+          </a:fontRef>
+        </p:style>
+        <p:txBody>
+          <a:bodyPr rtlCol="0" anchor="ctr"/>
+          <a:lstStyle/>
+          <a:p>
+            <a:pPr algn="ctr"/>
+            <a:r>
+              <a:rPr lang="en-SG" sz="1050" dirty="0">
+                <a:latin typeface="Arial" panose="020B0604020202020204" pitchFamily="34" charset="0"/>
+                <a:cs typeface="Arial" panose="020B0604020202020204" pitchFamily="34" charset="0"/>
+              </a:rPr>
+              <a:t>9</a:t>
+            </a:r>
+          </a:p>
+        </p:txBody>
+      </p:sp>
+      <p:sp>
+        <p:nvSpPr>
+          <p:cNvPr id="115" name="Oval 114">
+            <a:extLst>
+              <a:ext uri="{FF2B5EF4-FFF2-40B4-BE49-F238E27FC236}">
+                <a16:creationId xmlns:a16="http://schemas.microsoft.com/office/drawing/2014/main" id="{1DB69763-4055-4347-B5A0-9D499580688B}"/>
+              </a:ext>
+            </a:extLst>
+          </p:cNvPr>
+          <p:cNvSpPr/>
+          <p:nvPr/>
+        </p:nvSpPr>
+        <p:spPr>
+          <a:xfrm>
+            <a:off x="4417866" y="5591896"/>
+            <a:ext cx="189761" cy="187646"/>
+          </a:xfrm>
+          <a:prstGeom prst="ellipse">
+            <a:avLst/>
+          </a:prstGeom>
+          <a:solidFill>
+            <a:schemeClr val="tx1"/>
+          </a:solidFill>
+          <a:ln>
+            <a:solidFill>
+              <a:schemeClr val="tx1"/>
+            </a:solidFill>
+          </a:ln>
+        </p:spPr>
+        <p:style>
+          <a:lnRef idx="2">
+            <a:schemeClr val="dk1">
+              <a:shade val="50000"/>
+            </a:schemeClr>
+          </a:lnRef>
+          <a:fillRef idx="1">
+            <a:schemeClr val="dk1"/>
+          </a:fillRef>
+          <a:effectRef idx="0">
+            <a:schemeClr val="dk1"/>
+          </a:effectRef>
+          <a:fontRef idx="minor">
+            <a:schemeClr val="lt1"/>
+          </a:fontRef>
+        </p:style>
+        <p:txBody>
+          <a:bodyPr rtlCol="0" anchor="ctr"/>
+          <a:lstStyle/>
+          <a:p>
+            <a:pPr algn="ctr"/>
+            <a:endParaRPr lang="en-SG" sz="1050" dirty="0">
+              <a:latin typeface="Arial" panose="020B0604020202020204" pitchFamily="34" charset="0"/>
+              <a:cs typeface="Arial" panose="020B0604020202020204" pitchFamily="34" charset="0"/>
+            </a:endParaRPr>
+          </a:p>
+        </p:txBody>
+      </p:sp>
+      <p:sp>
+        <p:nvSpPr>
+          <p:cNvPr id="31" name="TextBox 30">
+            <a:extLst>
+              <a:ext uri="{FF2B5EF4-FFF2-40B4-BE49-F238E27FC236}">
+                <a16:creationId xmlns:a16="http://schemas.microsoft.com/office/drawing/2014/main" id="{10E595C5-D58A-41B2-BC74-A3C1101B0004}"/>
               </a:ext>
             </a:extLst>
           </p:cNvPr>
@@ -6352,8 +7385,8 @@
         </p:nvSpPr>
         <p:spPr>
           <a:xfrm>
-            <a:off x="7010400" y="5732225"/>
-            <a:ext cx="258404" cy="261610"/>
+            <a:off x="4345072" y="5554379"/>
+            <a:ext cx="335348" cy="253916"/>
           </a:xfrm>
           <a:prstGeom prst="rect">
             <a:avLst/>
@@ -6367,22 +7400,81 @@
           <a:lstStyle/>
           <a:p>
             <a:r>
-              <a:rPr lang="en-SG" sz="1100" dirty="0">
+              <a:rPr lang="en-SG" sz="1050" dirty="0">
                 <a:solidFill>
-                  <a:srgbClr val="002060"/>
+                  <a:schemeClr val="bg1"/>
                 </a:solidFill>
+                <a:latin typeface="Arial" panose="020B0604020202020204" pitchFamily="34" charset="0"/>
+                <a:cs typeface="Arial" panose="020B0604020202020204" pitchFamily="34" charset="0"/>
               </a:rPr>
-              <a:t>X</a:t>
-            </a:r>
-          </a:p>
-        </p:txBody>
-      </p:sp>
-      <p:sp>
-        <p:nvSpPr>
-          <p:cNvPr id="74" name="TextBox 73">
+              <a:t>10</a:t>
+            </a:r>
+          </a:p>
+        </p:txBody>
+      </p:sp>
+      <p:sp>
+        <p:nvSpPr>
+          <p:cNvPr id="119" name="Oval 118">
             <a:extLst>
               <a:ext uri="{FF2B5EF4-FFF2-40B4-BE49-F238E27FC236}">
-                <a16:creationId xmlns:a16="http://schemas.microsoft.com/office/drawing/2014/main" id="{D70C2ACD-E3FC-47F4-9C31-5A6BAA0E0806}"/>
+                <a16:creationId xmlns:a16="http://schemas.microsoft.com/office/drawing/2014/main" id="{3F44A0CF-824E-4F2A-96B8-E8B9452079C9}"/>
+              </a:ext>
+            </a:extLst>
+          </p:cNvPr>
+          <p:cNvSpPr/>
+          <p:nvPr/>
+        </p:nvSpPr>
+        <p:spPr>
+          <a:xfrm>
+            <a:off x="884779" y="5747853"/>
+            <a:ext cx="189761" cy="187646"/>
+          </a:xfrm>
+          <a:prstGeom prst="ellipse">
+            <a:avLst/>
+          </a:prstGeom>
+          <a:solidFill>
+            <a:schemeClr val="tx1"/>
+          </a:solidFill>
+          <a:ln>
+            <a:solidFill>
+              <a:schemeClr val="tx1"/>
+            </a:solidFill>
+          </a:ln>
+        </p:spPr>
+        <p:style>
+          <a:lnRef idx="2">
+            <a:schemeClr val="dk1">
+              <a:shade val="50000"/>
+            </a:schemeClr>
+          </a:lnRef>
+          <a:fillRef idx="1">
+            <a:schemeClr val="dk1"/>
+          </a:fillRef>
+          <a:effectRef idx="0">
+            <a:schemeClr val="dk1"/>
+          </a:effectRef>
+          <a:fontRef idx="minor">
+            <a:schemeClr val="lt1"/>
+          </a:fontRef>
+        </p:style>
+        <p:txBody>
+          <a:bodyPr rtlCol="0" anchor="ctr"/>
+          <a:lstStyle/>
+          <a:p>
+            <a:pPr algn="ctr"/>
+            <a:endParaRPr lang="en-SG" sz="1050" dirty="0">
+              <a:latin typeface="Arial" panose="020B0604020202020204" pitchFamily="34" charset="0"/>
+              <a:cs typeface="Arial" panose="020B0604020202020204" pitchFamily="34" charset="0"/>
+            </a:endParaRPr>
+          </a:p>
+        </p:txBody>
+      </p:sp>
+      <p:sp>
+        <p:nvSpPr>
+          <p:cNvPr id="117" name="TextBox 116">
+            <a:extLst>
+              <a:ext uri="{FF2B5EF4-FFF2-40B4-BE49-F238E27FC236}">
+                <a16:creationId xmlns:a16="http://schemas.microsoft.com/office/drawing/2014/main" id="{0B836AA9-41E1-4783-AD9D-11CE42941F72}"/>
               </a:ext>
             </a:extLst>
           </p:cNvPr>
@@ -6391,8 +7483,8 @@
         </p:nvSpPr>
         <p:spPr>
           <a:xfrm>
-            <a:off x="5418476" y="2908611"/>
-            <a:ext cx="258404" cy="261610"/>
+            <a:off x="821155" y="5712330"/>
+            <a:ext cx="335348" cy="253916"/>
           </a:xfrm>
           <a:prstGeom prst="rect">
             <a:avLst/>
@@ -6406,137 +7498,68 @@
           <a:lstStyle/>
           <a:p>
             <a:r>
-              <a:rPr lang="en-SG" sz="1100" dirty="0">
+              <a:rPr lang="en-SG" sz="1050" dirty="0">
                 <a:solidFill>
-                  <a:srgbClr val="002060"/>
+                  <a:schemeClr val="bg1"/>
                 </a:solidFill>
+                <a:latin typeface="Arial" panose="020B0604020202020204" pitchFamily="34" charset="0"/>
+                <a:cs typeface="Arial" panose="020B0604020202020204" pitchFamily="34" charset="0"/>
               </a:rPr>
-              <a:t>X</a:t>
-            </a:r>
-          </a:p>
-        </p:txBody>
-      </p:sp>
-      <p:sp>
-        <p:nvSpPr>
-          <p:cNvPr id="72" name="TextBox 71">
+              <a:t>11</a:t>
+            </a:r>
+          </a:p>
+        </p:txBody>
+      </p:sp>
+      <p:sp>
+        <p:nvSpPr>
+          <p:cNvPr id="120" name="Rectangle 119">
             <a:extLst>
               <a:ext uri="{FF2B5EF4-FFF2-40B4-BE49-F238E27FC236}">
-                <a16:creationId xmlns:a16="http://schemas.microsoft.com/office/drawing/2014/main" id="{0088772A-2E7D-4729-98DA-1298F1F19D6A}"/>
+                <a16:creationId xmlns:a16="http://schemas.microsoft.com/office/drawing/2014/main" id="{0E9D1BE6-9ED4-4446-B73C-EF3065F42D47}"/>
               </a:ext>
             </a:extLst>
           </p:cNvPr>
-          <p:cNvSpPr txBox="1"/>
+          <p:cNvSpPr/>
           <p:nvPr/>
         </p:nvSpPr>
         <p:spPr>
           <a:xfrm>
-            <a:off x="7160451" y="3766105"/>
-            <a:ext cx="1474852" cy="153888"/>
+            <a:off x="9910876" y="3429000"/>
+            <a:ext cx="183730" cy="414435"/>
           </a:xfrm>
           <a:prstGeom prst="rect">
             <a:avLst/>
           </a:prstGeom>
-          <a:noFill/>
-        </p:spPr>
-        <p:txBody>
-          <a:bodyPr wrap="square" lIns="0" tIns="0" rIns="0" bIns="0" rtlCol="0">
-            <a:spAutoFit/>
-          </a:bodyPr>
-          <a:lstStyle>
-            <a:defPPr>
-              <a:defRPr lang="en-US"/>
-            </a:defPPr>
-            <a:lvl1pPr algn="r">
-              <a:defRPr sz="1400">
-                <a:solidFill>
-                  <a:srgbClr val="0070C0"/>
-                </a:solidFill>
-              </a:defRPr>
-            </a:lvl1pPr>
-          </a:lstStyle>
+          <a:solidFill>
+            <a:srgbClr val="7030A0"/>
+          </a:solidFill>
+          <a:ln>
+            <a:solidFill>
+              <a:srgbClr val="7030A0"/>
+            </a:solidFill>
+          </a:ln>
+          <a:effectLst/>
+        </p:spPr>
+        <p:style>
+          <a:lnRef idx="1">
+            <a:schemeClr val="accent3"/>
+          </a:lnRef>
+          <a:fillRef idx="2">
+            <a:schemeClr val="accent3"/>
+          </a:fillRef>
+          <a:effectRef idx="1">
+            <a:schemeClr val="accent3"/>
+          </a:effectRef>
+          <a:fontRef idx="minor">
+            <a:schemeClr val="dk1"/>
+          </a:fontRef>
+        </p:style>
+        <p:txBody>
+          <a:bodyPr rtlCol="0" anchor="ctr"/>
+          <a:lstStyle/>
           <a:p>
             <a:pPr algn="ctr"/>
-            <a:r>
-              <a:rPr lang="en-US" sz="1000" dirty="0" err="1">
-                <a:solidFill>
-                  <a:schemeClr val="accent4">
-                    <a:lumMod val="75000"/>
-                  </a:schemeClr>
-                </a:solidFill>
-              </a:rPr>
-              <a:t>patientToUpdate</a:t>
-            </a:r>
-            <a:endParaRPr lang="en-US" sz="1000" dirty="0"/>
-          </a:p>
-        </p:txBody>
-      </p:sp>
-      <p:sp>
-        <p:nvSpPr>
-          <p:cNvPr id="63" name="TextBox 62">
-            <a:extLst>
-              <a:ext uri="{FF2B5EF4-FFF2-40B4-BE49-F238E27FC236}">
-                <a16:creationId xmlns:a16="http://schemas.microsoft.com/office/drawing/2014/main" id="{B5F9922B-50F1-4C97-98BE-015A3FC9DA66}"/>
-              </a:ext>
-            </a:extLst>
-          </p:cNvPr>
-          <p:cNvSpPr txBox="1"/>
-          <p:nvPr/>
-        </p:nvSpPr>
-        <p:spPr>
-          <a:xfrm rot="632758">
-            <a:off x="7129009" y="3773400"/>
-            <a:ext cx="261610" cy="276999"/>
-          </a:xfrm>
-          <a:prstGeom prst="rect">
-            <a:avLst/>
-          </a:prstGeom>
-          <a:noFill/>
-        </p:spPr>
-        <p:txBody>
-          <a:bodyPr wrap="none" rtlCol="0">
-            <a:spAutoFit/>
-          </a:bodyPr>
-          <a:lstStyle/>
-          <a:p>
-            <a:r>
-              <a:rPr lang="en-SG" sz="1200" b="1" dirty="0"/>
-              <a:t>&lt;</a:t>
-            </a:r>
-          </a:p>
-        </p:txBody>
-      </p:sp>
-      <p:sp>
-        <p:nvSpPr>
-          <p:cNvPr id="73" name="TextBox 72">
-            <a:extLst>
-              <a:ext uri="{FF2B5EF4-FFF2-40B4-BE49-F238E27FC236}">
-                <a16:creationId xmlns:a16="http://schemas.microsoft.com/office/drawing/2014/main" id="{1780ECC1-F2B8-4CFE-9F40-4C6C9FBA0402}"/>
-              </a:ext>
-            </a:extLst>
-          </p:cNvPr>
-          <p:cNvSpPr txBox="1"/>
-          <p:nvPr/>
-        </p:nvSpPr>
-        <p:spPr>
-          <a:xfrm rot="632758">
-            <a:off x="7129009" y="4502511"/>
-            <a:ext cx="261610" cy="276999"/>
-          </a:xfrm>
-          <a:prstGeom prst="rect">
-            <a:avLst/>
-          </a:prstGeom>
-          <a:noFill/>
-        </p:spPr>
-        <p:txBody>
-          <a:bodyPr wrap="none" rtlCol="0">
-            <a:spAutoFit/>
-          </a:bodyPr>
-          <a:lstStyle/>
-          <a:p>
-            <a:r>
-              <a:rPr lang="en-SG" sz="1200" b="1" dirty="0"/>
-              <a:t>&lt;</a:t>
-            </a:r>
+            <a:endParaRPr lang="en-SG" sz="1400"/>
           </a:p>
         </p:txBody>
       </p:sp>

</xml_diff>